<commit_message>
added slides for part 1 of presentation
</commit_message>
<xml_diff>
--- a/Memory.pptx
+++ b/Memory.pptx
@@ -4,12 +4,19 @@
   <p:sldMasterIdLst>
     <p:sldMasterId id="2147483822" r:id="rId1"/>
   </p:sldMasterIdLst>
+  <p:notesMasterIdLst>
+    <p:notesMasterId r:id="rId11"/>
+  </p:notesMasterIdLst>
   <p:sldIdLst>
     <p:sldId id="256" r:id="rId2"/>
     <p:sldId id="260" r:id="rId3"/>
-    <p:sldId id="261" r:id="rId4"/>
-    <p:sldId id="266" r:id="rId5"/>
-    <p:sldId id="267" r:id="rId6"/>
+    <p:sldId id="268" r:id="rId4"/>
+    <p:sldId id="269" r:id="rId5"/>
+    <p:sldId id="270" r:id="rId6"/>
+    <p:sldId id="271" r:id="rId7"/>
+    <p:sldId id="261" r:id="rId8"/>
+    <p:sldId id="266" r:id="rId9"/>
+    <p:sldId id="267" r:id="rId10"/>
   </p:sldIdLst>
   <p:sldSz cx="12192000" cy="6858000"/>
   <p:notesSz cx="6858000" cy="9144000"/>
@@ -116,6 +123,524 @@
 </p:presentation>
 </file>
 
+<file path=ppt/notesMasters/notesMaster1.xml><?xml version="1.0" encoding="utf-8"?>
+<p:notesMaster xmlns:a="http://schemas.openxmlformats.org/drawingml/2006/main" xmlns:r="http://schemas.openxmlformats.org/officeDocument/2006/relationships" xmlns:p="http://schemas.openxmlformats.org/presentationml/2006/main">
+  <p:cSld>
+    <p:bg>
+      <p:bgRef idx="1001">
+        <a:schemeClr val="bg1"/>
+      </p:bgRef>
+    </p:bg>
+    <p:spTree>
+      <p:nvGrpSpPr>
+        <p:cNvPr id="1" name=""/>
+        <p:cNvGrpSpPr/>
+        <p:nvPr/>
+      </p:nvGrpSpPr>
+      <p:grpSpPr>
+        <a:xfrm>
+          <a:off x="0" y="0"/>
+          <a:ext cx="0" cy="0"/>
+          <a:chOff x="0" y="0"/>
+          <a:chExt cx="0" cy="0"/>
+        </a:xfrm>
+      </p:grpSpPr>
+      <p:sp>
+        <p:nvSpPr>
+          <p:cNvPr id="2" name="Kopfzeilenplatzhalter 1"/>
+          <p:cNvSpPr>
+            <a:spLocks noGrp="1"/>
+          </p:cNvSpPr>
+          <p:nvPr>
+            <p:ph type="hdr" sz="quarter"/>
+          </p:nvPr>
+        </p:nvSpPr>
+        <p:spPr>
+          <a:xfrm>
+            <a:off x="0" y="0"/>
+            <a:ext cx="2971800" cy="458788"/>
+          </a:xfrm>
+          <a:prstGeom prst="rect">
+            <a:avLst/>
+          </a:prstGeom>
+        </p:spPr>
+        <p:txBody>
+          <a:bodyPr vert="horz" lIns="91440" tIns="45720" rIns="91440" bIns="45720" rtlCol="0"/>
+          <a:lstStyle>
+            <a:lvl1pPr algn="l">
+              <a:defRPr sz="1200"/>
+            </a:lvl1pPr>
+          </a:lstStyle>
+          <a:p>
+            <a:endParaRPr lang="de-DE"/>
+          </a:p>
+        </p:txBody>
+      </p:sp>
+      <p:sp>
+        <p:nvSpPr>
+          <p:cNvPr id="3" name="Datumsplatzhalter 2"/>
+          <p:cNvSpPr>
+            <a:spLocks noGrp="1"/>
+          </p:cNvSpPr>
+          <p:nvPr>
+            <p:ph type="dt" idx="1"/>
+          </p:nvPr>
+        </p:nvSpPr>
+        <p:spPr>
+          <a:xfrm>
+            <a:off x="3884613" y="0"/>
+            <a:ext cx="2971800" cy="458788"/>
+          </a:xfrm>
+          <a:prstGeom prst="rect">
+            <a:avLst/>
+          </a:prstGeom>
+        </p:spPr>
+        <p:txBody>
+          <a:bodyPr vert="horz" lIns="91440" tIns="45720" rIns="91440" bIns="45720" rtlCol="0"/>
+          <a:lstStyle>
+            <a:lvl1pPr algn="r">
+              <a:defRPr sz="1200"/>
+            </a:lvl1pPr>
+          </a:lstStyle>
+          <a:p>
+            <a:fld id="{F4CA3E79-370D-427E-A8C9-62587A8B4DBE}" type="datetimeFigureOut">
+              <a:rPr lang="de-DE" smtClean="0"/>
+              <a:t>01.04.2018</a:t>
+            </a:fld>
+            <a:endParaRPr lang="de-DE"/>
+          </a:p>
+        </p:txBody>
+      </p:sp>
+      <p:sp>
+        <p:nvSpPr>
+          <p:cNvPr id="4" name="Folienbildplatzhalter 3"/>
+          <p:cNvSpPr>
+            <a:spLocks noGrp="1" noRot="1" noChangeAspect="1"/>
+          </p:cNvSpPr>
+          <p:nvPr>
+            <p:ph type="sldImg" idx="2"/>
+          </p:nvPr>
+        </p:nvSpPr>
+        <p:spPr>
+          <a:xfrm>
+            <a:off x="685800" y="1143000"/>
+            <a:ext cx="5486400" cy="3086100"/>
+          </a:xfrm>
+          <a:prstGeom prst="rect">
+            <a:avLst/>
+          </a:prstGeom>
+          <a:noFill/>
+          <a:ln w="12700">
+            <a:solidFill>
+              <a:prstClr val="black"/>
+            </a:solidFill>
+          </a:ln>
+        </p:spPr>
+        <p:txBody>
+          <a:bodyPr vert="horz" lIns="91440" tIns="45720" rIns="91440" bIns="45720" rtlCol="0" anchor="ctr"/>
+          <a:lstStyle/>
+          <a:p>
+            <a:endParaRPr lang="de-DE"/>
+          </a:p>
+        </p:txBody>
+      </p:sp>
+      <p:sp>
+        <p:nvSpPr>
+          <p:cNvPr id="5" name="Notizenplatzhalter 4"/>
+          <p:cNvSpPr>
+            <a:spLocks noGrp="1"/>
+          </p:cNvSpPr>
+          <p:nvPr>
+            <p:ph type="body" sz="quarter" idx="3"/>
+          </p:nvPr>
+        </p:nvSpPr>
+        <p:spPr>
+          <a:xfrm>
+            <a:off x="685800" y="4400550"/>
+            <a:ext cx="5486400" cy="3600450"/>
+          </a:xfrm>
+          <a:prstGeom prst="rect">
+            <a:avLst/>
+          </a:prstGeom>
+        </p:spPr>
+        <p:txBody>
+          <a:bodyPr vert="horz" lIns="91440" tIns="45720" rIns="91440" bIns="45720" rtlCol="0"/>
+          <a:lstStyle/>
+          <a:p>
+            <a:pPr lvl="0"/>
+            <a:r>
+              <a:rPr lang="de-DE" smtClean="0"/>
+              <a:t>Textmasterformat bearbeiten</a:t>
+            </a:r>
+          </a:p>
+          <a:p>
+            <a:pPr lvl="1"/>
+            <a:r>
+              <a:rPr lang="de-DE" smtClean="0"/>
+              <a:t>Zweite Ebene</a:t>
+            </a:r>
+          </a:p>
+          <a:p>
+            <a:pPr lvl="2"/>
+            <a:r>
+              <a:rPr lang="de-DE" smtClean="0"/>
+              <a:t>Dritte Ebene</a:t>
+            </a:r>
+          </a:p>
+          <a:p>
+            <a:pPr lvl="3"/>
+            <a:r>
+              <a:rPr lang="de-DE" smtClean="0"/>
+              <a:t>Vierte Ebene</a:t>
+            </a:r>
+          </a:p>
+          <a:p>
+            <a:pPr lvl="4"/>
+            <a:r>
+              <a:rPr lang="de-DE" smtClean="0"/>
+              <a:t>Fünfte Ebene</a:t>
+            </a:r>
+            <a:endParaRPr lang="de-DE"/>
+          </a:p>
+        </p:txBody>
+      </p:sp>
+      <p:sp>
+        <p:nvSpPr>
+          <p:cNvPr id="6" name="Fußzeilenplatzhalter 5"/>
+          <p:cNvSpPr>
+            <a:spLocks noGrp="1"/>
+          </p:cNvSpPr>
+          <p:nvPr>
+            <p:ph type="ftr" sz="quarter" idx="4"/>
+          </p:nvPr>
+        </p:nvSpPr>
+        <p:spPr>
+          <a:xfrm>
+            <a:off x="0" y="8685213"/>
+            <a:ext cx="2971800" cy="458787"/>
+          </a:xfrm>
+          <a:prstGeom prst="rect">
+            <a:avLst/>
+          </a:prstGeom>
+        </p:spPr>
+        <p:txBody>
+          <a:bodyPr vert="horz" lIns="91440" tIns="45720" rIns="91440" bIns="45720" rtlCol="0" anchor="b"/>
+          <a:lstStyle>
+            <a:lvl1pPr algn="l">
+              <a:defRPr sz="1200"/>
+            </a:lvl1pPr>
+          </a:lstStyle>
+          <a:p>
+            <a:endParaRPr lang="de-DE"/>
+          </a:p>
+        </p:txBody>
+      </p:sp>
+      <p:sp>
+        <p:nvSpPr>
+          <p:cNvPr id="7" name="Foliennummernplatzhalter 6"/>
+          <p:cNvSpPr>
+            <a:spLocks noGrp="1"/>
+          </p:cNvSpPr>
+          <p:nvPr>
+            <p:ph type="sldNum" sz="quarter" idx="5"/>
+          </p:nvPr>
+        </p:nvSpPr>
+        <p:spPr>
+          <a:xfrm>
+            <a:off x="3884613" y="8685213"/>
+            <a:ext cx="2971800" cy="458787"/>
+          </a:xfrm>
+          <a:prstGeom prst="rect">
+            <a:avLst/>
+          </a:prstGeom>
+        </p:spPr>
+        <p:txBody>
+          <a:bodyPr vert="horz" lIns="91440" tIns="45720" rIns="91440" bIns="45720" rtlCol="0" anchor="b"/>
+          <a:lstStyle>
+            <a:lvl1pPr algn="r">
+              <a:defRPr sz="1200"/>
+            </a:lvl1pPr>
+          </a:lstStyle>
+          <a:p>
+            <a:fld id="{FE7161BA-70B5-470A-89FF-2464C74D71AC}" type="slidenum">
+              <a:rPr lang="de-DE" smtClean="0"/>
+              <a:t>‹Nr.›</a:t>
+            </a:fld>
+            <a:endParaRPr lang="de-DE"/>
+          </a:p>
+        </p:txBody>
+      </p:sp>
+    </p:spTree>
+    <p:extLst>
+      <p:ext uri="{BB962C8B-B14F-4D97-AF65-F5344CB8AC3E}">
+        <p14:creationId xmlns:p14="http://schemas.microsoft.com/office/powerpoint/2010/main" val="310312781"/>
+      </p:ext>
+    </p:extLst>
+  </p:cSld>
+  <p:clrMap bg1="lt1" tx1="dk1" bg2="lt2" tx2="dk2" accent1="accent1" accent2="accent2" accent3="accent3" accent4="accent4" accent5="accent5" accent6="accent6" hlink="hlink" folHlink="folHlink"/>
+  <p:notesStyle>
+    <a:lvl1pPr marL="0" algn="l" defTabSz="914400" rtl="0" eaLnBrk="1" latinLnBrk="0" hangingPunct="1">
+      <a:defRPr sz="1200" kern="1200">
+        <a:solidFill>
+          <a:schemeClr val="tx1"/>
+        </a:solidFill>
+        <a:latin typeface="+mn-lt"/>
+        <a:ea typeface="+mn-ea"/>
+        <a:cs typeface="+mn-cs"/>
+      </a:defRPr>
+    </a:lvl1pPr>
+    <a:lvl2pPr marL="457200" algn="l" defTabSz="914400" rtl="0" eaLnBrk="1" latinLnBrk="0" hangingPunct="1">
+      <a:defRPr sz="1200" kern="1200">
+        <a:solidFill>
+          <a:schemeClr val="tx1"/>
+        </a:solidFill>
+        <a:latin typeface="+mn-lt"/>
+        <a:ea typeface="+mn-ea"/>
+        <a:cs typeface="+mn-cs"/>
+      </a:defRPr>
+    </a:lvl2pPr>
+    <a:lvl3pPr marL="914400" algn="l" defTabSz="914400" rtl="0" eaLnBrk="1" latinLnBrk="0" hangingPunct="1">
+      <a:defRPr sz="1200" kern="1200">
+        <a:solidFill>
+          <a:schemeClr val="tx1"/>
+        </a:solidFill>
+        <a:latin typeface="+mn-lt"/>
+        <a:ea typeface="+mn-ea"/>
+        <a:cs typeface="+mn-cs"/>
+      </a:defRPr>
+    </a:lvl3pPr>
+    <a:lvl4pPr marL="1371600" algn="l" defTabSz="914400" rtl="0" eaLnBrk="1" latinLnBrk="0" hangingPunct="1">
+      <a:defRPr sz="1200" kern="1200">
+        <a:solidFill>
+          <a:schemeClr val="tx1"/>
+        </a:solidFill>
+        <a:latin typeface="+mn-lt"/>
+        <a:ea typeface="+mn-ea"/>
+        <a:cs typeface="+mn-cs"/>
+      </a:defRPr>
+    </a:lvl4pPr>
+    <a:lvl5pPr marL="1828800" algn="l" defTabSz="914400" rtl="0" eaLnBrk="1" latinLnBrk="0" hangingPunct="1">
+      <a:defRPr sz="1200" kern="1200">
+        <a:solidFill>
+          <a:schemeClr val="tx1"/>
+        </a:solidFill>
+        <a:latin typeface="+mn-lt"/>
+        <a:ea typeface="+mn-ea"/>
+        <a:cs typeface="+mn-cs"/>
+      </a:defRPr>
+    </a:lvl5pPr>
+    <a:lvl6pPr marL="2286000" algn="l" defTabSz="914400" rtl="0" eaLnBrk="1" latinLnBrk="0" hangingPunct="1">
+      <a:defRPr sz="1200" kern="1200">
+        <a:solidFill>
+          <a:schemeClr val="tx1"/>
+        </a:solidFill>
+        <a:latin typeface="+mn-lt"/>
+        <a:ea typeface="+mn-ea"/>
+        <a:cs typeface="+mn-cs"/>
+      </a:defRPr>
+    </a:lvl6pPr>
+    <a:lvl7pPr marL="2743200" algn="l" defTabSz="914400" rtl="0" eaLnBrk="1" latinLnBrk="0" hangingPunct="1">
+      <a:defRPr sz="1200" kern="1200">
+        <a:solidFill>
+          <a:schemeClr val="tx1"/>
+        </a:solidFill>
+        <a:latin typeface="+mn-lt"/>
+        <a:ea typeface="+mn-ea"/>
+        <a:cs typeface="+mn-cs"/>
+      </a:defRPr>
+    </a:lvl7pPr>
+    <a:lvl8pPr marL="3200400" algn="l" defTabSz="914400" rtl="0" eaLnBrk="1" latinLnBrk="0" hangingPunct="1">
+      <a:defRPr sz="1200" kern="1200">
+        <a:solidFill>
+          <a:schemeClr val="tx1"/>
+        </a:solidFill>
+        <a:latin typeface="+mn-lt"/>
+        <a:ea typeface="+mn-ea"/>
+        <a:cs typeface="+mn-cs"/>
+      </a:defRPr>
+    </a:lvl8pPr>
+    <a:lvl9pPr marL="3657600" algn="l" defTabSz="914400" rtl="0" eaLnBrk="1" latinLnBrk="0" hangingPunct="1">
+      <a:defRPr sz="1200" kern="1200">
+        <a:solidFill>
+          <a:schemeClr val="tx1"/>
+        </a:solidFill>
+        <a:latin typeface="+mn-lt"/>
+        <a:ea typeface="+mn-ea"/>
+        <a:cs typeface="+mn-cs"/>
+      </a:defRPr>
+    </a:lvl9pPr>
+  </p:notesStyle>
+</p:notesMaster>
+</file>
+
+<file path=ppt/notesSlides/notesSlide1.xml><?xml version="1.0" encoding="utf-8"?>
+<p:notes xmlns:a="http://schemas.openxmlformats.org/drawingml/2006/main" xmlns:r="http://schemas.openxmlformats.org/officeDocument/2006/relationships" xmlns:p="http://schemas.openxmlformats.org/presentationml/2006/main">
+  <p:cSld>
+    <p:spTree>
+      <p:nvGrpSpPr>
+        <p:cNvPr id="1" name=""/>
+        <p:cNvGrpSpPr/>
+        <p:nvPr/>
+      </p:nvGrpSpPr>
+      <p:grpSpPr>
+        <a:xfrm>
+          <a:off x="0" y="0"/>
+          <a:ext cx="0" cy="0"/>
+          <a:chOff x="0" y="0"/>
+          <a:chExt cx="0" cy="0"/>
+        </a:xfrm>
+      </p:grpSpPr>
+      <p:sp>
+        <p:nvSpPr>
+          <p:cNvPr id="2" name="Folienbildplatzhalter 1"/>
+          <p:cNvSpPr>
+            <a:spLocks noGrp="1" noRot="1" noChangeAspect="1"/>
+          </p:cNvSpPr>
+          <p:nvPr>
+            <p:ph type="sldImg"/>
+          </p:nvPr>
+        </p:nvSpPr>
+        <p:spPr/>
+      </p:sp>
+      <p:sp>
+        <p:nvSpPr>
+          <p:cNvPr id="3" name="Notizenplatzhalter 2"/>
+          <p:cNvSpPr>
+            <a:spLocks noGrp="1"/>
+          </p:cNvSpPr>
+          <p:nvPr>
+            <p:ph type="body" idx="1"/>
+          </p:nvPr>
+        </p:nvSpPr>
+        <p:spPr/>
+        <p:txBody>
+          <a:bodyPr/>
+          <a:lstStyle/>
+          <a:p>
+            <a:endParaRPr lang="de-DE" dirty="0"/>
+          </a:p>
+        </p:txBody>
+      </p:sp>
+      <p:sp>
+        <p:nvSpPr>
+          <p:cNvPr id="4" name="Foliennummernplatzhalter 3"/>
+          <p:cNvSpPr>
+            <a:spLocks noGrp="1"/>
+          </p:cNvSpPr>
+          <p:nvPr>
+            <p:ph type="sldNum" sz="quarter" idx="10"/>
+          </p:nvPr>
+        </p:nvSpPr>
+        <p:spPr/>
+        <p:txBody>
+          <a:bodyPr/>
+          <a:lstStyle/>
+          <a:p>
+            <a:fld id="{FE7161BA-70B5-470A-89FF-2464C74D71AC}" type="slidenum">
+              <a:rPr lang="de-DE" smtClean="0"/>
+              <a:t>5</a:t>
+            </a:fld>
+            <a:endParaRPr lang="de-DE"/>
+          </a:p>
+        </p:txBody>
+      </p:sp>
+    </p:spTree>
+    <p:extLst>
+      <p:ext uri="{BB962C8B-B14F-4D97-AF65-F5344CB8AC3E}">
+        <p14:creationId xmlns:p14="http://schemas.microsoft.com/office/powerpoint/2010/main" val="796962117"/>
+      </p:ext>
+    </p:extLst>
+  </p:cSld>
+  <p:clrMapOvr>
+    <a:masterClrMapping/>
+  </p:clrMapOvr>
+</p:notes>
+</file>
+
+<file path=ppt/notesSlides/notesSlide2.xml><?xml version="1.0" encoding="utf-8"?>
+<p:notes xmlns:a="http://schemas.openxmlformats.org/drawingml/2006/main" xmlns:r="http://schemas.openxmlformats.org/officeDocument/2006/relationships" xmlns:p="http://schemas.openxmlformats.org/presentationml/2006/main">
+  <p:cSld>
+    <p:spTree>
+      <p:nvGrpSpPr>
+        <p:cNvPr id="1" name=""/>
+        <p:cNvGrpSpPr/>
+        <p:nvPr/>
+      </p:nvGrpSpPr>
+      <p:grpSpPr>
+        <a:xfrm>
+          <a:off x="0" y="0"/>
+          <a:ext cx="0" cy="0"/>
+          <a:chOff x="0" y="0"/>
+          <a:chExt cx="0" cy="0"/>
+        </a:xfrm>
+      </p:grpSpPr>
+      <p:sp>
+        <p:nvSpPr>
+          <p:cNvPr id="2" name="Folienbildplatzhalter 1"/>
+          <p:cNvSpPr>
+            <a:spLocks noGrp="1" noRot="1" noChangeAspect="1"/>
+          </p:cNvSpPr>
+          <p:nvPr>
+            <p:ph type="sldImg"/>
+          </p:nvPr>
+        </p:nvSpPr>
+        <p:spPr/>
+      </p:sp>
+      <p:sp>
+        <p:nvSpPr>
+          <p:cNvPr id="3" name="Notizenplatzhalter 2"/>
+          <p:cNvSpPr>
+            <a:spLocks noGrp="1"/>
+          </p:cNvSpPr>
+          <p:nvPr>
+            <p:ph type="body" idx="1"/>
+          </p:nvPr>
+        </p:nvSpPr>
+        <p:spPr/>
+        <p:txBody>
+          <a:bodyPr/>
+          <a:lstStyle/>
+          <a:p>
+            <a:endParaRPr lang="de-DE" dirty="0"/>
+          </a:p>
+        </p:txBody>
+      </p:sp>
+      <p:sp>
+        <p:nvSpPr>
+          <p:cNvPr id="4" name="Foliennummernplatzhalter 3"/>
+          <p:cNvSpPr>
+            <a:spLocks noGrp="1"/>
+          </p:cNvSpPr>
+          <p:nvPr>
+            <p:ph type="sldNum" sz="quarter" idx="10"/>
+          </p:nvPr>
+        </p:nvSpPr>
+        <p:spPr/>
+        <p:txBody>
+          <a:bodyPr/>
+          <a:lstStyle/>
+          <a:p>
+            <a:fld id="{FE7161BA-70B5-470A-89FF-2464C74D71AC}" type="slidenum">
+              <a:rPr lang="de-DE" smtClean="0"/>
+              <a:t>6</a:t>
+            </a:fld>
+            <a:endParaRPr lang="de-DE"/>
+          </a:p>
+        </p:txBody>
+      </p:sp>
+    </p:spTree>
+    <p:extLst>
+      <p:ext uri="{BB962C8B-B14F-4D97-AF65-F5344CB8AC3E}">
+        <p14:creationId xmlns:p14="http://schemas.microsoft.com/office/powerpoint/2010/main" val="3778828817"/>
+      </p:ext>
+    </p:extLst>
+  </p:cSld>
+  <p:clrMapOvr>
+    <a:masterClrMapping/>
+  </p:clrMapOvr>
+</p:notes>
+</file>
+
 <file path=ppt/slideLayouts/slideLayout1.xml><?xml version="1.0" encoding="utf-8"?>
 <p:sldLayout xmlns:a="http://schemas.openxmlformats.org/drawingml/2006/main" xmlns:r="http://schemas.openxmlformats.org/officeDocument/2006/relationships" xmlns:p="http://schemas.openxmlformats.org/presentationml/2006/main" type="title" preserve="1">
   <p:cSld name="Titelfolie">
@@ -316,7 +841,7 @@
           <a:p>
             <a:fld id="{1697554C-315A-4B1C-AB76-9710B4BA9F70}" type="datetimeFigureOut">
               <a:rPr lang="de-DE" smtClean="0"/>
-              <a:t>30.03.2018</a:t>
+              <a:t>01.04.2018</a:t>
             </a:fld>
             <a:endParaRPr lang="de-DE"/>
           </a:p>
@@ -506,7 +1031,7 @@
           <a:p>
             <a:fld id="{1697554C-315A-4B1C-AB76-9710B4BA9F70}" type="datetimeFigureOut">
               <a:rPr lang="de-DE" smtClean="0"/>
-              <a:t>30.03.2018</a:t>
+              <a:t>01.04.2018</a:t>
             </a:fld>
             <a:endParaRPr lang="de-DE"/>
           </a:p>
@@ -686,7 +1211,7 @@
           <a:p>
             <a:fld id="{1697554C-315A-4B1C-AB76-9710B4BA9F70}" type="datetimeFigureOut">
               <a:rPr lang="de-DE" smtClean="0"/>
-              <a:t>30.03.2018</a:t>
+              <a:t>01.04.2018</a:t>
             </a:fld>
             <a:endParaRPr lang="de-DE"/>
           </a:p>
@@ -856,7 +1381,7 @@
           <a:p>
             <a:fld id="{1697554C-315A-4B1C-AB76-9710B4BA9F70}" type="datetimeFigureOut">
               <a:rPr lang="de-DE" smtClean="0"/>
-              <a:t>30.03.2018</a:t>
+              <a:t>01.04.2018</a:t>
             </a:fld>
             <a:endParaRPr lang="de-DE"/>
           </a:p>
@@ -1112,7 +1637,7 @@
           <a:p>
             <a:fld id="{1697554C-315A-4B1C-AB76-9710B4BA9F70}" type="datetimeFigureOut">
               <a:rPr lang="de-DE" smtClean="0"/>
-              <a:t>30.03.2018</a:t>
+              <a:t>01.04.2018</a:t>
             </a:fld>
             <a:endParaRPr lang="de-DE"/>
           </a:p>
@@ -1400,7 +1925,7 @@
           <a:p>
             <a:fld id="{1697554C-315A-4B1C-AB76-9710B4BA9F70}" type="datetimeFigureOut">
               <a:rPr lang="de-DE" smtClean="0"/>
-              <a:t>30.03.2018</a:t>
+              <a:t>01.04.2018</a:t>
             </a:fld>
             <a:endParaRPr lang="de-DE"/>
           </a:p>
@@ -1838,7 +2363,7 @@
           <a:p>
             <a:fld id="{1697554C-315A-4B1C-AB76-9710B4BA9F70}" type="datetimeFigureOut">
               <a:rPr lang="de-DE" smtClean="0"/>
-              <a:t>30.03.2018</a:t>
+              <a:t>01.04.2018</a:t>
             </a:fld>
             <a:endParaRPr lang="de-DE"/>
           </a:p>
@@ -1956,7 +2481,7 @@
           <a:p>
             <a:fld id="{1697554C-315A-4B1C-AB76-9710B4BA9F70}" type="datetimeFigureOut">
               <a:rPr lang="de-DE" smtClean="0"/>
-              <a:t>30.03.2018</a:t>
+              <a:t>01.04.2018</a:t>
             </a:fld>
             <a:endParaRPr lang="de-DE"/>
           </a:p>
@@ -2051,7 +2576,7 @@
           <a:p>
             <a:fld id="{1697554C-315A-4B1C-AB76-9710B4BA9F70}" type="datetimeFigureOut">
               <a:rPr lang="de-DE" smtClean="0"/>
-              <a:t>30.03.2018</a:t>
+              <a:t>01.04.2018</a:t>
             </a:fld>
             <a:endParaRPr lang="de-DE"/>
           </a:p>
@@ -2407,7 +2932,7 @@
           <a:p>
             <a:fld id="{1697554C-315A-4B1C-AB76-9710B4BA9F70}" type="datetimeFigureOut">
               <a:rPr lang="de-DE" smtClean="0"/>
-              <a:t>30.03.2018</a:t>
+              <a:t>01.04.2018</a:t>
             </a:fld>
             <a:endParaRPr lang="de-DE"/>
           </a:p>
@@ -2723,7 +3248,7 @@
           <a:p>
             <a:fld id="{1697554C-315A-4B1C-AB76-9710B4BA9F70}" type="datetimeFigureOut">
               <a:rPr lang="de-DE" smtClean="0"/>
-              <a:t>30.03.2018</a:t>
+              <a:t>01.04.2018</a:t>
             </a:fld>
             <a:endParaRPr lang="de-DE"/>
           </a:p>
@@ -2956,7 +3481,7 @@
           <a:p>
             <a:fld id="{1697554C-315A-4B1C-AB76-9710B4BA9F70}" type="datetimeFigureOut">
               <a:rPr lang="de-DE" smtClean="0"/>
-              <a:t>30.03.2018</a:t>
+              <a:t>01.04.2018</a:t>
             </a:fld>
             <a:endParaRPr lang="de-DE"/>
           </a:p>
@@ -3590,8 +4115,12 @@
           <a:lstStyle/>
           <a:p>
             <a:r>
-              <a:rPr lang="de-DE" dirty="0"/>
-              <a:t>Spiel – Aufbau und Design</a:t>
+              <a:rPr lang="de-DE" dirty="0" smtClean="0"/>
+              <a:t>Gliederung </a:t>
+            </a:r>
+            <a:r>
+              <a:rPr lang="de-DE" dirty="0" smtClean="0"/>
+              <a:t>Lobby</a:t>
             </a:r>
             <a:endParaRPr lang="de-DE" dirty="0"/>
           </a:p>
@@ -3609,47 +4138,295 @@
         </p:nvSpPr>
         <p:spPr/>
         <p:txBody>
-          <a:bodyPr>
+          <a:bodyPr/>
+          <a:lstStyle/>
+          <a:p>
+            <a:endParaRPr lang="de-DE" dirty="0"/>
+          </a:p>
+          <a:p>
+            <a:endParaRPr lang="de-DE" dirty="0"/>
+          </a:p>
+        </p:txBody>
+      </p:sp>
+      <p:sp>
+        <p:nvSpPr>
+          <p:cNvPr id="6" name="Inhaltsplatzhalter 2"/>
+          <p:cNvSpPr txBox="1">
+            <a:spLocks/>
+          </p:cNvSpPr>
+          <p:nvPr/>
+        </p:nvSpPr>
+        <p:spPr>
+          <a:xfrm>
+            <a:off x="829056" y="2164080"/>
+            <a:ext cx="10753725" cy="3766185"/>
+          </a:xfrm>
+          <a:prstGeom prst="rect">
+            <a:avLst/>
+          </a:prstGeom>
+        </p:spPr>
+        <p:txBody>
+          <a:bodyPr vert="horz" lIns="91440" tIns="45720" rIns="91440" bIns="45720" rtlCol="0">
             <a:normAutofit/>
           </a:bodyPr>
-          <a:lstStyle/>
-          <a:p>
+          <a:lstStyle>
+            <a:lvl1pPr marL="91440" indent="-91440" algn="l" defTabSz="914400" rtl="0" eaLnBrk="1" latinLnBrk="0" hangingPunct="1">
+              <a:lnSpc>
+                <a:spcPct val="85000"/>
+              </a:lnSpc>
+              <a:spcBef>
+                <a:spcPts val="1300"/>
+              </a:spcBef>
+              <a:buFont typeface="Arial" pitchFamily="34" charset="0"/>
+              <a:buChar char=" "/>
+              <a:defRPr sz="2400" kern="1200">
+                <a:solidFill>
+                  <a:schemeClr val="tx1">
+                    <a:lumMod val="85000"/>
+                    <a:lumOff val="15000"/>
+                  </a:schemeClr>
+                </a:solidFill>
+                <a:latin typeface="+mn-lt"/>
+                <a:ea typeface="+mn-ea"/>
+                <a:cs typeface="+mn-cs"/>
+              </a:defRPr>
+            </a:lvl1pPr>
+            <a:lvl2pPr marL="347472" indent="-342900" algn="l" defTabSz="914400" rtl="0" eaLnBrk="1" latinLnBrk="0" hangingPunct="1">
+              <a:lnSpc>
+                <a:spcPct val="85000"/>
+              </a:lnSpc>
+              <a:spcBef>
+                <a:spcPts val="600"/>
+              </a:spcBef>
+              <a:buFont typeface="Arial" pitchFamily="34" charset="0"/>
+              <a:buChar char=" "/>
+              <a:defRPr sz="2400" kern="1200">
+                <a:solidFill>
+                  <a:schemeClr val="tx1">
+                    <a:lumMod val="85000"/>
+                    <a:lumOff val="15000"/>
+                  </a:schemeClr>
+                </a:solidFill>
+                <a:latin typeface="+mn-lt"/>
+                <a:ea typeface="+mn-ea"/>
+                <a:cs typeface="+mn-cs"/>
+              </a:defRPr>
+            </a:lvl2pPr>
+            <a:lvl3pPr marL="548640" indent="-548640" algn="l" defTabSz="914400" rtl="0" eaLnBrk="1" latinLnBrk="0" hangingPunct="1">
+              <a:lnSpc>
+                <a:spcPct val="85000"/>
+              </a:lnSpc>
+              <a:spcBef>
+                <a:spcPts val="600"/>
+              </a:spcBef>
+              <a:buFont typeface="Arial" pitchFamily="34" charset="0"/>
+              <a:buChar char=" "/>
+              <a:defRPr sz="2000" i="1" kern="1200">
+                <a:solidFill>
+                  <a:schemeClr val="tx1">
+                    <a:lumMod val="85000"/>
+                    <a:lumOff val="15000"/>
+                  </a:schemeClr>
+                </a:solidFill>
+                <a:latin typeface="+mn-lt"/>
+                <a:ea typeface="+mn-ea"/>
+                <a:cs typeface="+mn-cs"/>
+              </a:defRPr>
+            </a:lvl3pPr>
+            <a:lvl4pPr marL="822960" indent="-822960" algn="l" defTabSz="914400" rtl="0" eaLnBrk="1" latinLnBrk="0" hangingPunct="1">
+              <a:lnSpc>
+                <a:spcPct val="85000"/>
+              </a:lnSpc>
+              <a:spcBef>
+                <a:spcPts val="600"/>
+              </a:spcBef>
+              <a:buFont typeface="Arial" pitchFamily="34" charset="0"/>
+              <a:buChar char=" "/>
+              <a:defRPr sz="1800" kern="1200">
+                <a:solidFill>
+                  <a:schemeClr val="tx1">
+                    <a:lumMod val="85000"/>
+                    <a:lumOff val="15000"/>
+                  </a:schemeClr>
+                </a:solidFill>
+                <a:latin typeface="+mn-lt"/>
+                <a:ea typeface="+mn-ea"/>
+                <a:cs typeface="+mn-cs"/>
+              </a:defRPr>
+            </a:lvl4pPr>
+            <a:lvl5pPr marL="1097280" indent="-1097280" algn="l" defTabSz="914400" rtl="0" eaLnBrk="1" latinLnBrk="0" hangingPunct="1">
+              <a:lnSpc>
+                <a:spcPct val="85000"/>
+              </a:lnSpc>
+              <a:spcBef>
+                <a:spcPts val="600"/>
+              </a:spcBef>
+              <a:buFont typeface="Arial" pitchFamily="34" charset="0"/>
+              <a:buChar char=" "/>
+              <a:defRPr sz="1800" kern="1200">
+                <a:solidFill>
+                  <a:schemeClr val="tx1">
+                    <a:lumMod val="85000"/>
+                    <a:lumOff val="15000"/>
+                  </a:schemeClr>
+                </a:solidFill>
+                <a:latin typeface="+mn-lt"/>
+                <a:ea typeface="+mn-ea"/>
+                <a:cs typeface="+mn-cs"/>
+              </a:defRPr>
+            </a:lvl5pPr>
+            <a:lvl6pPr marL="1200000" indent="-228600" algn="l" defTabSz="914400" rtl="0" eaLnBrk="1" latinLnBrk="0" hangingPunct="1">
+              <a:lnSpc>
+                <a:spcPct val="85000"/>
+              </a:lnSpc>
+              <a:spcBef>
+                <a:spcPts val="600"/>
+              </a:spcBef>
+              <a:buFont typeface="Arial" pitchFamily="34" charset="0"/>
+              <a:buChar char=" "/>
+              <a:defRPr sz="1800" kern="1200">
+                <a:solidFill>
+                  <a:schemeClr val="tx1">
+                    <a:lumMod val="85000"/>
+                    <a:lumOff val="15000"/>
+                  </a:schemeClr>
+                </a:solidFill>
+                <a:latin typeface="+mn-lt"/>
+                <a:ea typeface="+mn-ea"/>
+                <a:cs typeface="+mn-cs"/>
+              </a:defRPr>
+            </a:lvl6pPr>
+            <a:lvl7pPr marL="1400000" indent="-228600" algn="l" defTabSz="914400" rtl="0" eaLnBrk="1" latinLnBrk="0" hangingPunct="1">
+              <a:lnSpc>
+                <a:spcPct val="85000"/>
+              </a:lnSpc>
+              <a:spcBef>
+                <a:spcPts val="600"/>
+              </a:spcBef>
+              <a:buFont typeface="Arial" pitchFamily="34" charset="0"/>
+              <a:buChar char=" "/>
+              <a:defRPr sz="1800" kern="1200">
+                <a:solidFill>
+                  <a:schemeClr val="tx1">
+                    <a:lumMod val="85000"/>
+                    <a:lumOff val="15000"/>
+                  </a:schemeClr>
+                </a:solidFill>
+                <a:latin typeface="+mn-lt"/>
+                <a:ea typeface="+mn-ea"/>
+                <a:cs typeface="+mn-cs"/>
+              </a:defRPr>
+            </a:lvl7pPr>
+            <a:lvl8pPr marL="1600000" indent="-228600" algn="l" defTabSz="914400" rtl="0" eaLnBrk="1" latinLnBrk="0" hangingPunct="1">
+              <a:lnSpc>
+                <a:spcPct val="85000"/>
+              </a:lnSpc>
+              <a:spcBef>
+                <a:spcPts val="600"/>
+              </a:spcBef>
+              <a:buFont typeface="Arial" pitchFamily="34" charset="0"/>
+              <a:buChar char=" "/>
+              <a:defRPr sz="1800" kern="1200">
+                <a:solidFill>
+                  <a:schemeClr val="tx1">
+                    <a:lumMod val="85000"/>
+                    <a:lumOff val="15000"/>
+                  </a:schemeClr>
+                </a:solidFill>
+                <a:latin typeface="+mn-lt"/>
+                <a:ea typeface="+mn-ea"/>
+                <a:cs typeface="+mn-cs"/>
+              </a:defRPr>
+            </a:lvl8pPr>
+            <a:lvl9pPr marL="1800000" indent="-228600" algn="l" defTabSz="914400" rtl="0" eaLnBrk="1" latinLnBrk="0" hangingPunct="1">
+              <a:lnSpc>
+                <a:spcPct val="85000"/>
+              </a:lnSpc>
+              <a:spcBef>
+                <a:spcPts val="600"/>
+              </a:spcBef>
+              <a:buFont typeface="Arial" pitchFamily="34" charset="0"/>
+              <a:buChar char=" "/>
+              <a:defRPr sz="1800" kern="1200">
+                <a:solidFill>
+                  <a:schemeClr val="tx1">
+                    <a:lumMod val="85000"/>
+                    <a:lumOff val="15000"/>
+                  </a:schemeClr>
+                </a:solidFill>
+                <a:latin typeface="+mn-lt"/>
+                <a:ea typeface="+mn-ea"/>
+                <a:cs typeface="+mn-cs"/>
+              </a:defRPr>
+            </a:lvl9pPr>
+          </a:lstStyle>
+          <a:p>
+            <a:pPr marL="457200" indent="-457200">
+              <a:buFont typeface="+mj-lt"/>
+              <a:buAutoNum type="arabicPeriod"/>
+            </a:pPr>
             <a:r>
               <a:rPr lang="de-DE" dirty="0" smtClean="0"/>
-              <a:t>Aufbau Spiel HTML – Vorstellen XSLT Datei</a:t>
-            </a:r>
-          </a:p>
-          <a:p>
+              <a:t>Definition </a:t>
+            </a:r>
             <a:r>
               <a:rPr lang="de-DE" dirty="0" smtClean="0"/>
-              <a:t>Vorstellen Design der Karten</a:t>
-            </a:r>
-          </a:p>
-          <a:p>
+              <a:t>XForms </a:t>
+            </a:r>
             <a:r>
               <a:rPr lang="de-DE" dirty="0" smtClean="0"/>
-              <a:t>Spielen </a:t>
-            </a:r>
-            <a:r>
-              <a:rPr lang="de-DE" dirty="0"/>
-              <a:t>mehrere Spiele </a:t>
-            </a:r>
+              <a:t>Instance und Submissions</a:t>
+            </a:r>
+          </a:p>
+          <a:p>
+            <a:pPr marL="457200" indent="-457200">
+              <a:buFont typeface="+mj-lt"/>
+              <a:buAutoNum type="arabicPeriod"/>
+            </a:pPr>
             <a:r>
               <a:rPr lang="de-DE" dirty="0" smtClean="0"/>
-              <a:t>gleichzeitig möglich – Zeigen</a:t>
-            </a:r>
-            <a:endParaRPr lang="de-DE" dirty="0"/>
-          </a:p>
-          <a:p>
-            <a:r>
-              <a:rPr lang="de-DE" dirty="0"/>
-              <a:t>Nachsehen Karten in Quellcode </a:t>
-            </a:r>
+              <a:t>Hintergrund</a:t>
+            </a:r>
+          </a:p>
+          <a:p>
+            <a:pPr marL="457200" indent="-457200">
+              <a:buFont typeface="+mj-lt"/>
+              <a:buAutoNum type="arabicPeriod"/>
+            </a:pPr>
             <a:r>
               <a:rPr lang="de-DE" dirty="0" smtClean="0"/>
-              <a:t>ausschließen – Zeigen</a:t>
-            </a:r>
-            <a:endParaRPr lang="de-DE" dirty="0"/>
+              <a:t>Logo</a:t>
+            </a:r>
+          </a:p>
+          <a:p>
+            <a:pPr marL="457200" indent="-457200">
+              <a:buFont typeface="+mj-lt"/>
+              <a:buAutoNum type="arabicPeriod"/>
+            </a:pPr>
+            <a:r>
+              <a:rPr lang="de-DE" dirty="0" smtClean="0"/>
+              <a:t>Input und Auswahl neues Spiel</a:t>
+            </a:r>
+          </a:p>
+          <a:p>
+            <a:pPr marL="457200" indent="-457200">
+              <a:buFont typeface="+mj-lt"/>
+              <a:buAutoNum type="arabicPeriod"/>
+            </a:pPr>
+            <a:r>
+              <a:rPr lang="de-DE" dirty="0" smtClean="0"/>
+              <a:t>Auswahl gespeichertes Spiel</a:t>
+            </a:r>
+          </a:p>
+          <a:p>
+            <a:pPr marL="457200" indent="-457200">
+              <a:buFont typeface="+mj-lt"/>
+              <a:buAutoNum type="arabicPeriod"/>
+            </a:pPr>
+            <a:r>
+              <a:rPr lang="de-DE" dirty="0" smtClean="0"/>
+              <a:t>Ausgabe gespeicherte Highscores</a:t>
+            </a:r>
           </a:p>
           <a:p>
             <a:endParaRPr lang="de-DE" dirty="0"/>
@@ -3659,7 +4436,7 @@
     </p:spTree>
     <p:extLst>
       <p:ext uri="{BB962C8B-B14F-4D97-AF65-F5344CB8AC3E}">
-        <p14:creationId xmlns:p14="http://schemas.microsoft.com/office/powerpoint/2010/main" val="1642387876"/>
+        <p14:creationId xmlns:p14="http://schemas.microsoft.com/office/powerpoint/2010/main" val="2602016569"/>
       </p:ext>
     </p:extLst>
   </p:cSld>
@@ -3703,71 +4480,652 @@
           <a:p>
             <a:r>
               <a:rPr lang="de-DE" dirty="0" smtClean="0"/>
-              <a:t>Spiel – Karten Logik</a:t>
+              <a:t>Aufbau Spiel Daten</a:t>
             </a:r>
             <a:endParaRPr lang="de-DE" dirty="0"/>
           </a:p>
         </p:txBody>
       </p:sp>
-      <p:sp>
-        <p:nvSpPr>
-          <p:cNvPr id="3" name="Inhaltsplatzhalter 2"/>
-          <p:cNvSpPr>
-            <a:spLocks noGrp="1"/>
-          </p:cNvSpPr>
-          <p:nvPr>
-            <p:ph idx="1"/>
-          </p:nvPr>
-        </p:nvSpPr>
-        <p:spPr/>
-        <p:txBody>
-          <a:bodyPr>
-            <a:normAutofit/>
-          </a:bodyPr>
-          <a:lstStyle/>
-          <a:p>
-            <a:r>
-              <a:rPr lang="de-DE" dirty="0" smtClean="0"/>
-              <a:t>Vorstellen der Funktion - Drehen </a:t>
-            </a:r>
-            <a:r>
-              <a:rPr lang="de-DE" dirty="0"/>
-              <a:t>Karten</a:t>
-            </a:r>
-          </a:p>
-          <a:p>
-            <a:r>
-              <a:rPr lang="de-DE" dirty="0" smtClean="0"/>
-              <a:t>Aktualisierung Spieler und Punkte</a:t>
-            </a:r>
-          </a:p>
-          <a:p>
-            <a:r>
-              <a:rPr lang="de-DE" dirty="0"/>
-              <a:t>Anzeige Ergebnis nach Spielende</a:t>
-            </a:r>
-          </a:p>
-          <a:p>
-            <a:pPr marL="0" indent="0">
-              <a:buNone/>
-            </a:pPr>
-            <a:endParaRPr lang="de-DE" dirty="0" smtClean="0"/>
-          </a:p>
-          <a:p>
-            <a:endParaRPr lang="de-DE" dirty="0" smtClean="0"/>
-          </a:p>
-          <a:p>
-            <a:endParaRPr lang="de-DE" dirty="0"/>
-          </a:p>
-          <a:p>
-            <a:endParaRPr lang="de-DE" dirty="0"/>
-          </a:p>
-        </p:txBody>
-      </p:sp>
+      <p:graphicFrame>
+        <p:nvGraphicFramePr>
+          <p:cNvPr id="4" name="Tabelle 3"/>
+          <p:cNvGraphicFramePr>
+            <a:graphicFrameLocks noGrp="1"/>
+          </p:cNvGraphicFramePr>
+          <p:nvPr>
+            <p:extLst>
+              <p:ext uri="{D42A27DB-BD31-4B8C-83A1-F6EECF244321}">
+                <p14:modId xmlns:p14="http://schemas.microsoft.com/office/powerpoint/2010/main" val="2871021920"/>
+              </p:ext>
+            </p:extLst>
+          </p:nvPr>
+        </p:nvGraphicFramePr>
+        <p:xfrm>
+          <a:off x="657224" y="1642958"/>
+          <a:ext cx="10464165" cy="2011680"/>
+        </p:xfrm>
+        <a:graphic>
+          <a:graphicData uri="http://schemas.openxmlformats.org/drawingml/2006/table">
+            <a:tbl>
+              <a:tblPr firstRow="1" bandRow="1">
+                <a:tableStyleId>{69012ECD-51FC-41F1-AA8D-1B2483CD663E}</a:tableStyleId>
+              </a:tblPr>
+              <a:tblGrid>
+                <a:gridCol w="2714373"/>
+                <a:gridCol w="4070603"/>
+                <a:gridCol w="3679189"/>
+              </a:tblGrid>
+              <a:tr h="370840">
+                <a:tc>
+                  <a:txBody>
+                    <a:bodyPr/>
+                    <a:lstStyle/>
+                    <a:p>
+                      <a:endParaRPr lang="de-DE" sz="2400" b="0" dirty="0"/>
+                    </a:p>
+                  </a:txBody>
+                  <a:tcPr/>
+                </a:tc>
+                <a:tc>
+                  <a:txBody>
+                    <a:bodyPr/>
+                    <a:lstStyle/>
+                    <a:p>
+                      <a:r>
+                        <a:rPr lang="de-DE" sz="2400" b="0" dirty="0" smtClean="0"/>
+                        <a:t>Elemente</a:t>
+                      </a:r>
+                      <a:endParaRPr lang="de-DE" sz="2400" b="0" dirty="0"/>
+                    </a:p>
+                  </a:txBody>
+                  <a:tcPr/>
+                </a:tc>
+                <a:tc>
+                  <a:txBody>
+                    <a:bodyPr/>
+                    <a:lstStyle/>
+                    <a:p>
+                      <a:r>
+                        <a:rPr lang="de-DE" sz="2400" b="0" dirty="0" smtClean="0"/>
+                        <a:t>Attribute</a:t>
+                      </a:r>
+                      <a:endParaRPr lang="de-DE" sz="2400" b="0" dirty="0"/>
+                    </a:p>
+                  </a:txBody>
+                  <a:tcPr/>
+                </a:tc>
+              </a:tr>
+              <a:tr h="370840">
+                <a:tc>
+                  <a:txBody>
+                    <a:bodyPr/>
+                    <a:lstStyle/>
+                    <a:p>
+                      <a:r>
+                        <a:rPr lang="de-DE" sz="2400" dirty="0" smtClean="0"/>
+                        <a:t>game</a:t>
+                      </a:r>
+                      <a:endParaRPr lang="de-DE" sz="2400" dirty="0"/>
+                    </a:p>
+                  </a:txBody>
+                  <a:tcPr/>
+                </a:tc>
+                <a:tc>
+                  <a:txBody>
+                    <a:bodyPr/>
+                    <a:lstStyle/>
+                    <a:p>
+                      <a:pPr marL="342900" indent="-342900">
+                        <a:buFont typeface="Symbol" panose="05050102010706020507" pitchFamily="18" charset="2"/>
+                        <a:buChar char="-"/>
+                      </a:pPr>
+                      <a:r>
+                        <a:rPr lang="de-DE" sz="2400" dirty="0" err="1" smtClean="0"/>
+                        <a:t>players</a:t>
+                      </a:r>
+                      <a:endParaRPr lang="de-DE" sz="2400" dirty="0" smtClean="0"/>
+                    </a:p>
+                    <a:p>
+                      <a:pPr marL="342900" indent="-342900">
+                        <a:buFont typeface="Symbol" panose="05050102010706020507" pitchFamily="18" charset="2"/>
+                        <a:buChar char="-"/>
+                      </a:pPr>
+                      <a:r>
+                        <a:rPr lang="de-DE" sz="2400" dirty="0" err="1" smtClean="0"/>
+                        <a:t>cards</a:t>
+                      </a:r>
+                      <a:endParaRPr lang="de-DE" sz="2400" dirty="0" smtClean="0"/>
+                    </a:p>
+                    <a:p>
+                      <a:pPr marL="342900" indent="-342900">
+                        <a:buFont typeface="Symbol" panose="05050102010706020507" pitchFamily="18" charset="2"/>
+                        <a:buChar char="-"/>
+                      </a:pPr>
+                      <a:r>
+                        <a:rPr lang="de-DE" sz="2400" dirty="0" err="1" smtClean="0"/>
+                        <a:t>flipped_card</a:t>
+                      </a:r>
+                      <a:endParaRPr lang="de-DE" sz="2400" dirty="0" smtClean="0"/>
+                    </a:p>
+                    <a:p>
+                      <a:pPr marL="342900" indent="-342900">
+                        <a:buFont typeface="Symbol" panose="05050102010706020507" pitchFamily="18" charset="2"/>
+                        <a:buChar char="-"/>
+                      </a:pPr>
+                      <a:r>
+                        <a:rPr lang="de-DE" sz="2400" dirty="0" err="1" smtClean="0"/>
+                        <a:t>active_player_id</a:t>
+                      </a:r>
+                      <a:endParaRPr lang="de-DE" sz="2400" dirty="0" smtClean="0"/>
+                    </a:p>
+                  </a:txBody>
+                  <a:tcPr/>
+                </a:tc>
+                <a:tc>
+                  <a:txBody>
+                    <a:bodyPr/>
+                    <a:lstStyle/>
+                    <a:p>
+                      <a:pPr marL="342900" indent="-342900">
+                        <a:buFont typeface="Symbol" panose="05050102010706020507" pitchFamily="18" charset="2"/>
+                        <a:buChar char="-"/>
+                      </a:pPr>
+                      <a:r>
+                        <a:rPr lang="de-DE" sz="2400" dirty="0" err="1" smtClean="0"/>
+                        <a:t>id</a:t>
+                      </a:r>
+                      <a:endParaRPr lang="de-DE" sz="2400" dirty="0" smtClean="0"/>
+                    </a:p>
+                    <a:p>
+                      <a:pPr marL="342900" indent="-342900">
+                        <a:buFont typeface="Symbol" panose="05050102010706020507" pitchFamily="18" charset="2"/>
+                        <a:buChar char="-"/>
+                      </a:pPr>
+                      <a:r>
+                        <a:rPr lang="de-DE" sz="2400" dirty="0" err="1" smtClean="0"/>
+                        <a:t>game_state</a:t>
+                      </a:r>
+                      <a:endParaRPr lang="de-DE" sz="2400" dirty="0"/>
+                    </a:p>
+                  </a:txBody>
+                  <a:tcPr/>
+                </a:tc>
+              </a:tr>
+            </a:tbl>
+          </a:graphicData>
+        </a:graphic>
+      </p:graphicFrame>
+      <p:graphicFrame>
+        <p:nvGraphicFramePr>
+          <p:cNvPr id="7" name="Tabelle 6"/>
+          <p:cNvGraphicFramePr>
+            <a:graphicFrameLocks noGrp="1"/>
+          </p:cNvGraphicFramePr>
+          <p:nvPr>
+            <p:extLst>
+              <p:ext uri="{D42A27DB-BD31-4B8C-83A1-F6EECF244321}">
+                <p14:modId xmlns:p14="http://schemas.microsoft.com/office/powerpoint/2010/main" val="1954983045"/>
+              </p:ext>
+            </p:extLst>
+          </p:nvPr>
+        </p:nvGraphicFramePr>
+        <p:xfrm>
+          <a:off x="657225" y="3738458"/>
+          <a:ext cx="10464165" cy="914400"/>
+        </p:xfrm>
+        <a:graphic>
+          <a:graphicData uri="http://schemas.openxmlformats.org/drawingml/2006/table">
+            <a:tbl>
+              <a:tblPr firstRow="1" bandRow="1">
+                <a:tableStyleId>{69012ECD-51FC-41F1-AA8D-1B2483CD663E}</a:tableStyleId>
+              </a:tblPr>
+              <a:tblGrid>
+                <a:gridCol w="2720975"/>
+                <a:gridCol w="4064000"/>
+                <a:gridCol w="3679190"/>
+              </a:tblGrid>
+              <a:tr h="0">
+                <a:tc>
+                  <a:txBody>
+                    <a:bodyPr/>
+                    <a:lstStyle/>
+                    <a:p>
+                      <a:r>
+                        <a:rPr lang="de-DE" sz="2400" b="0" dirty="0" err="1" smtClean="0">
+                          <a:solidFill>
+                            <a:schemeClr val="tx1"/>
+                          </a:solidFill>
+                        </a:rPr>
+                        <a:t>players</a:t>
+                      </a:r>
+                      <a:endParaRPr lang="de-DE" sz="2400" b="0" dirty="0">
+                        <a:solidFill>
+                          <a:schemeClr val="tx1"/>
+                        </a:solidFill>
+                      </a:endParaRPr>
+                    </a:p>
+                  </a:txBody>
+                  <a:tcPr>
+                    <a:lnB w="12700" cap="flat" cmpd="sng" algn="ctr">
+                      <a:noFill/>
+                      <a:prstDash val="solid"/>
+                      <a:round/>
+                      <a:headEnd type="none" w="med" len="med"/>
+                      <a:tailEnd type="none" w="med" len="med"/>
+                    </a:lnB>
+                    <a:noFill/>
+                  </a:tcPr>
+                </a:tc>
+                <a:tc>
+                  <a:txBody>
+                    <a:bodyPr/>
+                    <a:lstStyle/>
+                    <a:p>
+                      <a:pPr marL="342900" indent="-342900">
+                        <a:buFont typeface="Symbol" panose="05050102010706020507" pitchFamily="18" charset="2"/>
+                        <a:buChar char="-"/>
+                      </a:pPr>
+                      <a:r>
+                        <a:rPr lang="de-DE" sz="2400" b="0" dirty="0" err="1" smtClean="0">
+                          <a:solidFill>
+                            <a:schemeClr val="tx1"/>
+                          </a:solidFill>
+                        </a:rPr>
+                        <a:t>player</a:t>
+                      </a:r>
+                      <a:endParaRPr lang="de-DE" sz="2400" b="0" dirty="0">
+                        <a:solidFill>
+                          <a:schemeClr val="tx1"/>
+                        </a:solidFill>
+                      </a:endParaRPr>
+                    </a:p>
+                  </a:txBody>
+                  <a:tcPr>
+                    <a:lnB w="12700" cap="flat" cmpd="sng" algn="ctr">
+                      <a:noFill/>
+                      <a:prstDash val="solid"/>
+                      <a:round/>
+                      <a:headEnd type="none" w="med" len="med"/>
+                      <a:tailEnd type="none" w="med" len="med"/>
+                    </a:lnB>
+                    <a:noFill/>
+                  </a:tcPr>
+                </a:tc>
+                <a:tc>
+                  <a:txBody>
+                    <a:bodyPr/>
+                    <a:lstStyle/>
+                    <a:p>
+                      <a:pPr marL="342900" indent="-342900">
+                        <a:buFont typeface="Symbol" panose="05050102010706020507" pitchFamily="18" charset="2"/>
+                        <a:buChar char="-"/>
+                      </a:pPr>
+                      <a:endParaRPr lang="de-DE" sz="2400" b="0" dirty="0">
+                        <a:solidFill>
+                          <a:schemeClr val="tx1"/>
+                        </a:solidFill>
+                      </a:endParaRPr>
+                    </a:p>
+                  </a:txBody>
+                  <a:tcPr>
+                    <a:lnB w="12700" cap="flat" cmpd="sng" algn="ctr">
+                      <a:noFill/>
+                      <a:prstDash val="solid"/>
+                      <a:round/>
+                      <a:headEnd type="none" w="med" len="med"/>
+                      <a:tailEnd type="none" w="med" len="med"/>
+                    </a:lnB>
+                    <a:noFill/>
+                  </a:tcPr>
+                </a:tc>
+              </a:tr>
+              <a:tr h="370840">
+                <a:tc>
+                  <a:txBody>
+                    <a:bodyPr/>
+                    <a:lstStyle/>
+                    <a:p>
+                      <a:r>
+                        <a:rPr lang="de-DE" sz="2400" dirty="0" err="1" smtClean="0"/>
+                        <a:t>cards</a:t>
+                      </a:r>
+                      <a:endParaRPr lang="de-DE" sz="2400" dirty="0"/>
+                    </a:p>
+                  </a:txBody>
+                  <a:tcPr>
+                    <a:lnT w="12700" cap="flat" cmpd="sng" algn="ctr">
+                      <a:noFill/>
+                      <a:prstDash val="solid"/>
+                      <a:round/>
+                      <a:headEnd type="none" w="med" len="med"/>
+                      <a:tailEnd type="none" w="med" len="med"/>
+                    </a:lnT>
+                  </a:tcPr>
+                </a:tc>
+                <a:tc>
+                  <a:txBody>
+                    <a:bodyPr/>
+                    <a:lstStyle/>
+                    <a:p>
+                      <a:pPr marL="342900" indent="-342900">
+                        <a:buFont typeface="Symbol" panose="05050102010706020507" pitchFamily="18" charset="2"/>
+                        <a:buChar char="-"/>
+                      </a:pPr>
+                      <a:r>
+                        <a:rPr lang="de-DE" sz="2400" dirty="0" err="1" smtClean="0"/>
+                        <a:t>card</a:t>
+                      </a:r>
+                      <a:endParaRPr lang="de-DE" sz="2400" dirty="0"/>
+                    </a:p>
+                  </a:txBody>
+                  <a:tcPr>
+                    <a:lnT w="12700" cap="flat" cmpd="sng" algn="ctr">
+                      <a:noFill/>
+                      <a:prstDash val="solid"/>
+                      <a:round/>
+                      <a:headEnd type="none" w="med" len="med"/>
+                      <a:tailEnd type="none" w="med" len="med"/>
+                    </a:lnT>
+                  </a:tcPr>
+                </a:tc>
+                <a:tc>
+                  <a:txBody>
+                    <a:bodyPr/>
+                    <a:lstStyle/>
+                    <a:p>
+                      <a:pPr marL="342900" indent="-342900">
+                        <a:buFont typeface="Symbol" panose="05050102010706020507" pitchFamily="18" charset="2"/>
+                        <a:buChar char="-"/>
+                      </a:pPr>
+                      <a:r>
+                        <a:rPr lang="de-DE" sz="2400" dirty="0" err="1" smtClean="0"/>
+                        <a:t>scale_factor</a:t>
+                      </a:r>
+                      <a:endParaRPr lang="de-DE" sz="2400" dirty="0"/>
+                    </a:p>
+                  </a:txBody>
+                  <a:tcPr>
+                    <a:lnT w="12700" cap="flat" cmpd="sng" algn="ctr">
+                      <a:noFill/>
+                      <a:prstDash val="solid"/>
+                      <a:round/>
+                      <a:headEnd type="none" w="med" len="med"/>
+                      <a:tailEnd type="none" w="med" len="med"/>
+                    </a:lnT>
+                  </a:tcPr>
+                </a:tc>
+              </a:tr>
+            </a:tbl>
+          </a:graphicData>
+        </a:graphic>
+      </p:graphicFrame>
+      <p:graphicFrame>
+        <p:nvGraphicFramePr>
+          <p:cNvPr id="10" name="Tabelle 9"/>
+          <p:cNvGraphicFramePr>
+            <a:graphicFrameLocks noGrp="1"/>
+          </p:cNvGraphicFramePr>
+          <p:nvPr>
+            <p:extLst>
+              <p:ext uri="{D42A27DB-BD31-4B8C-83A1-F6EECF244321}">
+                <p14:modId xmlns:p14="http://schemas.microsoft.com/office/powerpoint/2010/main" val="3952137469"/>
+              </p:ext>
+            </p:extLst>
+          </p:nvPr>
+        </p:nvGraphicFramePr>
+        <p:xfrm>
+          <a:off x="657225" y="4727153"/>
+          <a:ext cx="10464165" cy="2011680"/>
+        </p:xfrm>
+        <a:graphic>
+          <a:graphicData uri="http://schemas.openxmlformats.org/drawingml/2006/table">
+            <a:tbl>
+              <a:tblPr firstRow="1" bandRow="1">
+                <a:tableStyleId>{69012ECD-51FC-41F1-AA8D-1B2483CD663E}</a:tableStyleId>
+              </a:tblPr>
+              <a:tblGrid>
+                <a:gridCol w="2733675"/>
+                <a:gridCol w="4076700"/>
+                <a:gridCol w="3653790"/>
+              </a:tblGrid>
+              <a:tr h="370840">
+                <a:tc>
+                  <a:txBody>
+                    <a:bodyPr/>
+                    <a:lstStyle/>
+                    <a:p>
+                      <a:r>
+                        <a:rPr lang="de-DE" sz="2400" b="0" dirty="0" err="1" smtClean="0">
+                          <a:solidFill>
+                            <a:schemeClr val="tx1"/>
+                          </a:solidFill>
+                        </a:rPr>
+                        <a:t>player</a:t>
+                      </a:r>
+                      <a:endParaRPr lang="de-DE" sz="2400" b="0" dirty="0">
+                        <a:solidFill>
+                          <a:schemeClr val="tx1"/>
+                        </a:solidFill>
+                      </a:endParaRPr>
+                    </a:p>
+                  </a:txBody>
+                  <a:tcPr>
+                    <a:lnB w="12700" cap="flat" cmpd="sng" algn="ctr">
+                      <a:noFill/>
+                      <a:prstDash val="solid"/>
+                      <a:round/>
+                      <a:headEnd type="none" w="med" len="med"/>
+                      <a:tailEnd type="none" w="med" len="med"/>
+                    </a:lnB>
+                    <a:noFill/>
+                  </a:tcPr>
+                </a:tc>
+                <a:tc>
+                  <a:txBody>
+                    <a:bodyPr/>
+                    <a:lstStyle/>
+                    <a:p>
+                      <a:pPr marL="342900" indent="-342900">
+                        <a:buFont typeface="Symbol" panose="05050102010706020507" pitchFamily="18" charset="2"/>
+                        <a:buChar char="-"/>
+                      </a:pPr>
+                      <a:r>
+                        <a:rPr lang="de-DE" sz="2400" b="0" dirty="0" err="1" smtClean="0">
+                          <a:solidFill>
+                            <a:schemeClr val="tx1"/>
+                          </a:solidFill>
+                        </a:rPr>
+                        <a:t>name</a:t>
+                      </a:r>
+                      <a:endParaRPr lang="de-DE" sz="2400" b="0" dirty="0" smtClean="0">
+                        <a:solidFill>
+                          <a:schemeClr val="tx1"/>
+                        </a:solidFill>
+                      </a:endParaRPr>
+                    </a:p>
+                    <a:p>
+                      <a:pPr marL="342900" indent="-342900">
+                        <a:buFont typeface="Symbol" panose="05050102010706020507" pitchFamily="18" charset="2"/>
+                        <a:buChar char="-"/>
+                      </a:pPr>
+                      <a:r>
+                        <a:rPr lang="de-DE" sz="2400" b="0" dirty="0" err="1" smtClean="0">
+                          <a:solidFill>
+                            <a:schemeClr val="tx1"/>
+                          </a:solidFill>
+                        </a:rPr>
+                        <a:t>points</a:t>
+                      </a:r>
+                      <a:endParaRPr lang="de-DE" sz="2400" b="0" dirty="0">
+                        <a:solidFill>
+                          <a:schemeClr val="tx1"/>
+                        </a:solidFill>
+                      </a:endParaRPr>
+                    </a:p>
+                  </a:txBody>
+                  <a:tcPr>
+                    <a:lnB w="12700" cap="flat" cmpd="sng" algn="ctr">
+                      <a:noFill/>
+                      <a:prstDash val="solid"/>
+                      <a:round/>
+                      <a:headEnd type="none" w="med" len="med"/>
+                      <a:tailEnd type="none" w="med" len="med"/>
+                    </a:lnB>
+                    <a:noFill/>
+                  </a:tcPr>
+                </a:tc>
+                <a:tc>
+                  <a:txBody>
+                    <a:bodyPr/>
+                    <a:lstStyle/>
+                    <a:p>
+                      <a:pPr marL="342900" indent="-342900">
+                        <a:buFont typeface="Symbol" panose="05050102010706020507" pitchFamily="18" charset="2"/>
+                        <a:buChar char="-"/>
+                      </a:pPr>
+                      <a:r>
+                        <a:rPr lang="de-DE" sz="2400" b="0" dirty="0" err="1" smtClean="0">
+                          <a:solidFill>
+                            <a:schemeClr val="tx1"/>
+                          </a:solidFill>
+                        </a:rPr>
+                        <a:t>id</a:t>
+                      </a:r>
+                      <a:endParaRPr lang="de-DE" sz="2400" b="0" dirty="0">
+                        <a:solidFill>
+                          <a:schemeClr val="tx1"/>
+                        </a:solidFill>
+                      </a:endParaRPr>
+                    </a:p>
+                  </a:txBody>
+                  <a:tcPr>
+                    <a:lnB w="12700" cap="flat" cmpd="sng" algn="ctr">
+                      <a:noFill/>
+                      <a:prstDash val="solid"/>
+                      <a:round/>
+                      <a:headEnd type="none" w="med" len="med"/>
+                      <a:tailEnd type="none" w="med" len="med"/>
+                    </a:lnB>
+                    <a:noFill/>
+                  </a:tcPr>
+                </a:tc>
+              </a:tr>
+              <a:tr h="370840">
+                <a:tc>
+                  <a:txBody>
+                    <a:bodyPr/>
+                    <a:lstStyle/>
+                    <a:p>
+                      <a:r>
+                        <a:rPr lang="de-DE" sz="2400" dirty="0" err="1" smtClean="0"/>
+                        <a:t>card</a:t>
+                      </a:r>
+                      <a:endParaRPr lang="de-DE" sz="2400" dirty="0"/>
+                    </a:p>
+                  </a:txBody>
+                  <a:tcPr>
+                    <a:lnT w="12700" cap="flat" cmpd="sng" algn="ctr">
+                      <a:noFill/>
+                      <a:prstDash val="solid"/>
+                      <a:round/>
+                      <a:headEnd type="none" w="med" len="med"/>
+                      <a:tailEnd type="none" w="med" len="med"/>
+                    </a:lnT>
+                  </a:tcPr>
+                </a:tc>
+                <a:tc>
+                  <a:txBody>
+                    <a:bodyPr/>
+                    <a:lstStyle/>
+                    <a:p>
+                      <a:pPr marL="342900" indent="-342900">
+                        <a:buFont typeface="Symbol" panose="05050102010706020507" pitchFamily="18" charset="2"/>
+                        <a:buChar char="-"/>
+                      </a:pPr>
+                      <a:r>
+                        <a:rPr lang="de-DE" sz="2400" dirty="0" err="1" smtClean="0"/>
+                        <a:t>position_x</a:t>
+                      </a:r>
+                      <a:endParaRPr lang="de-DE" sz="2400" dirty="0" smtClean="0"/>
+                    </a:p>
+                    <a:p>
+                      <a:pPr marL="342900" indent="-342900">
+                        <a:buFont typeface="Symbol" panose="05050102010706020507" pitchFamily="18" charset="2"/>
+                        <a:buChar char="-"/>
+                      </a:pPr>
+                      <a:r>
+                        <a:rPr lang="de-DE" sz="2400" dirty="0" err="1" smtClean="0"/>
+                        <a:t>position_y</a:t>
+                      </a:r>
+                      <a:endParaRPr lang="de-DE" sz="2400" dirty="0"/>
+                    </a:p>
+                  </a:txBody>
+                  <a:tcPr>
+                    <a:lnT w="12700" cap="flat" cmpd="sng" algn="ctr">
+                      <a:noFill/>
+                      <a:prstDash val="solid"/>
+                      <a:round/>
+                      <a:headEnd type="none" w="med" len="med"/>
+                      <a:tailEnd type="none" w="med" len="med"/>
+                    </a:lnT>
+                  </a:tcPr>
+                </a:tc>
+                <a:tc>
+                  <a:txBody>
+                    <a:bodyPr/>
+                    <a:lstStyle/>
+                    <a:p>
+                      <a:pPr marL="342900" indent="-342900">
+                        <a:buFont typeface="Symbol" panose="05050102010706020507" pitchFamily="18" charset="2"/>
+                        <a:buChar char="-"/>
+                      </a:pPr>
+                      <a:r>
+                        <a:rPr lang="de-DE" sz="2400" dirty="0" err="1" smtClean="0"/>
+                        <a:t>id</a:t>
+                      </a:r>
+                      <a:endParaRPr lang="de-DE" sz="2400" dirty="0" smtClean="0"/>
+                    </a:p>
+                    <a:p>
+                      <a:pPr marL="342900" indent="-342900">
+                        <a:buFont typeface="Symbol" panose="05050102010706020507" pitchFamily="18" charset="2"/>
+                        <a:buChar char="-"/>
+                      </a:pPr>
+                      <a:r>
+                        <a:rPr lang="de-DE" sz="2400" dirty="0" smtClean="0"/>
+                        <a:t>pair</a:t>
+                      </a:r>
+                    </a:p>
+                    <a:p>
+                      <a:pPr marL="342900" indent="-342900">
+                        <a:buFont typeface="Symbol" panose="05050102010706020507" pitchFamily="18" charset="2"/>
+                        <a:buChar char="-"/>
+                      </a:pPr>
+                      <a:r>
+                        <a:rPr lang="de-DE" sz="2400" dirty="0" err="1" smtClean="0"/>
+                        <a:t>card_state</a:t>
+                      </a:r>
+                      <a:endParaRPr lang="de-DE" sz="2400" dirty="0"/>
+                    </a:p>
+                  </a:txBody>
+                  <a:tcPr>
+                    <a:lnT w="12700" cap="flat" cmpd="sng" algn="ctr">
+                      <a:noFill/>
+                      <a:prstDash val="solid"/>
+                      <a:round/>
+                      <a:headEnd type="none" w="med" len="med"/>
+                      <a:tailEnd type="none" w="med" len="med"/>
+                    </a:lnT>
+                  </a:tcPr>
+                </a:tc>
+              </a:tr>
+            </a:tbl>
+          </a:graphicData>
+        </a:graphic>
+      </p:graphicFrame>
     </p:spTree>
     <p:extLst>
       <p:ext uri="{BB962C8B-B14F-4D97-AF65-F5344CB8AC3E}">
-        <p14:creationId xmlns:p14="http://schemas.microsoft.com/office/powerpoint/2010/main" val="1641024558"/>
+        <p14:creationId xmlns:p14="http://schemas.microsoft.com/office/powerpoint/2010/main" val="1778465304"/>
       </p:ext>
     </p:extLst>
   </p:cSld>
@@ -3811,6 +5169,2129 @@
           <a:p>
             <a:r>
               <a:rPr lang="de-DE" dirty="0" smtClean="0"/>
+              <a:t>Neues Spiel</a:t>
+            </a:r>
+            <a:endParaRPr lang="de-DE" dirty="0"/>
+          </a:p>
+        </p:txBody>
+      </p:sp>
+      <p:sp>
+        <p:nvSpPr>
+          <p:cNvPr id="6" name="Inhaltsplatzhalter 2"/>
+          <p:cNvSpPr txBox="1">
+            <a:spLocks/>
+          </p:cNvSpPr>
+          <p:nvPr/>
+        </p:nvSpPr>
+        <p:spPr>
+          <a:xfrm>
+            <a:off x="829056" y="2164080"/>
+            <a:ext cx="10753725" cy="3766185"/>
+          </a:xfrm>
+          <a:prstGeom prst="rect">
+            <a:avLst/>
+          </a:prstGeom>
+        </p:spPr>
+        <p:txBody>
+          <a:bodyPr vert="horz" lIns="91440" tIns="45720" rIns="91440" bIns="45720" rtlCol="0">
+            <a:normAutofit/>
+          </a:bodyPr>
+          <a:lstStyle>
+            <a:lvl1pPr marL="91440" indent="-91440" algn="l" defTabSz="914400" rtl="0" eaLnBrk="1" latinLnBrk="0" hangingPunct="1">
+              <a:lnSpc>
+                <a:spcPct val="85000"/>
+              </a:lnSpc>
+              <a:spcBef>
+                <a:spcPts val="1300"/>
+              </a:spcBef>
+              <a:buFont typeface="Arial" pitchFamily="34" charset="0"/>
+              <a:buChar char=" "/>
+              <a:defRPr sz="2400" kern="1200">
+                <a:solidFill>
+                  <a:schemeClr val="tx1">
+                    <a:lumMod val="85000"/>
+                    <a:lumOff val="15000"/>
+                  </a:schemeClr>
+                </a:solidFill>
+                <a:latin typeface="+mn-lt"/>
+                <a:ea typeface="+mn-ea"/>
+                <a:cs typeface="+mn-cs"/>
+              </a:defRPr>
+            </a:lvl1pPr>
+            <a:lvl2pPr marL="347472" indent="-342900" algn="l" defTabSz="914400" rtl="0" eaLnBrk="1" latinLnBrk="0" hangingPunct="1">
+              <a:lnSpc>
+                <a:spcPct val="85000"/>
+              </a:lnSpc>
+              <a:spcBef>
+                <a:spcPts val="600"/>
+              </a:spcBef>
+              <a:buFont typeface="Arial" pitchFamily="34" charset="0"/>
+              <a:buChar char=" "/>
+              <a:defRPr sz="2400" kern="1200">
+                <a:solidFill>
+                  <a:schemeClr val="tx1">
+                    <a:lumMod val="85000"/>
+                    <a:lumOff val="15000"/>
+                  </a:schemeClr>
+                </a:solidFill>
+                <a:latin typeface="+mn-lt"/>
+                <a:ea typeface="+mn-ea"/>
+                <a:cs typeface="+mn-cs"/>
+              </a:defRPr>
+            </a:lvl2pPr>
+            <a:lvl3pPr marL="548640" indent="-548640" algn="l" defTabSz="914400" rtl="0" eaLnBrk="1" latinLnBrk="0" hangingPunct="1">
+              <a:lnSpc>
+                <a:spcPct val="85000"/>
+              </a:lnSpc>
+              <a:spcBef>
+                <a:spcPts val="600"/>
+              </a:spcBef>
+              <a:buFont typeface="Arial" pitchFamily="34" charset="0"/>
+              <a:buChar char=" "/>
+              <a:defRPr sz="2000" i="1" kern="1200">
+                <a:solidFill>
+                  <a:schemeClr val="tx1">
+                    <a:lumMod val="85000"/>
+                    <a:lumOff val="15000"/>
+                  </a:schemeClr>
+                </a:solidFill>
+                <a:latin typeface="+mn-lt"/>
+                <a:ea typeface="+mn-ea"/>
+                <a:cs typeface="+mn-cs"/>
+              </a:defRPr>
+            </a:lvl3pPr>
+            <a:lvl4pPr marL="822960" indent="-822960" algn="l" defTabSz="914400" rtl="0" eaLnBrk="1" latinLnBrk="0" hangingPunct="1">
+              <a:lnSpc>
+                <a:spcPct val="85000"/>
+              </a:lnSpc>
+              <a:spcBef>
+                <a:spcPts val="600"/>
+              </a:spcBef>
+              <a:buFont typeface="Arial" pitchFamily="34" charset="0"/>
+              <a:buChar char=" "/>
+              <a:defRPr sz="1800" kern="1200">
+                <a:solidFill>
+                  <a:schemeClr val="tx1">
+                    <a:lumMod val="85000"/>
+                    <a:lumOff val="15000"/>
+                  </a:schemeClr>
+                </a:solidFill>
+                <a:latin typeface="+mn-lt"/>
+                <a:ea typeface="+mn-ea"/>
+                <a:cs typeface="+mn-cs"/>
+              </a:defRPr>
+            </a:lvl4pPr>
+            <a:lvl5pPr marL="1097280" indent="-1097280" algn="l" defTabSz="914400" rtl="0" eaLnBrk="1" latinLnBrk="0" hangingPunct="1">
+              <a:lnSpc>
+                <a:spcPct val="85000"/>
+              </a:lnSpc>
+              <a:spcBef>
+                <a:spcPts val="600"/>
+              </a:spcBef>
+              <a:buFont typeface="Arial" pitchFamily="34" charset="0"/>
+              <a:buChar char=" "/>
+              <a:defRPr sz="1800" kern="1200">
+                <a:solidFill>
+                  <a:schemeClr val="tx1">
+                    <a:lumMod val="85000"/>
+                    <a:lumOff val="15000"/>
+                  </a:schemeClr>
+                </a:solidFill>
+                <a:latin typeface="+mn-lt"/>
+                <a:ea typeface="+mn-ea"/>
+                <a:cs typeface="+mn-cs"/>
+              </a:defRPr>
+            </a:lvl5pPr>
+            <a:lvl6pPr marL="1200000" indent="-228600" algn="l" defTabSz="914400" rtl="0" eaLnBrk="1" latinLnBrk="0" hangingPunct="1">
+              <a:lnSpc>
+                <a:spcPct val="85000"/>
+              </a:lnSpc>
+              <a:spcBef>
+                <a:spcPts val="600"/>
+              </a:spcBef>
+              <a:buFont typeface="Arial" pitchFamily="34" charset="0"/>
+              <a:buChar char=" "/>
+              <a:defRPr sz="1800" kern="1200">
+                <a:solidFill>
+                  <a:schemeClr val="tx1">
+                    <a:lumMod val="85000"/>
+                    <a:lumOff val="15000"/>
+                  </a:schemeClr>
+                </a:solidFill>
+                <a:latin typeface="+mn-lt"/>
+                <a:ea typeface="+mn-ea"/>
+                <a:cs typeface="+mn-cs"/>
+              </a:defRPr>
+            </a:lvl6pPr>
+            <a:lvl7pPr marL="1400000" indent="-228600" algn="l" defTabSz="914400" rtl="0" eaLnBrk="1" latinLnBrk="0" hangingPunct="1">
+              <a:lnSpc>
+                <a:spcPct val="85000"/>
+              </a:lnSpc>
+              <a:spcBef>
+                <a:spcPts val="600"/>
+              </a:spcBef>
+              <a:buFont typeface="Arial" pitchFamily="34" charset="0"/>
+              <a:buChar char=" "/>
+              <a:defRPr sz="1800" kern="1200">
+                <a:solidFill>
+                  <a:schemeClr val="tx1">
+                    <a:lumMod val="85000"/>
+                    <a:lumOff val="15000"/>
+                  </a:schemeClr>
+                </a:solidFill>
+                <a:latin typeface="+mn-lt"/>
+                <a:ea typeface="+mn-ea"/>
+                <a:cs typeface="+mn-cs"/>
+              </a:defRPr>
+            </a:lvl7pPr>
+            <a:lvl8pPr marL="1600000" indent="-228600" algn="l" defTabSz="914400" rtl="0" eaLnBrk="1" latinLnBrk="0" hangingPunct="1">
+              <a:lnSpc>
+                <a:spcPct val="85000"/>
+              </a:lnSpc>
+              <a:spcBef>
+                <a:spcPts val="600"/>
+              </a:spcBef>
+              <a:buFont typeface="Arial" pitchFamily="34" charset="0"/>
+              <a:buChar char=" "/>
+              <a:defRPr sz="1800" kern="1200">
+                <a:solidFill>
+                  <a:schemeClr val="tx1">
+                    <a:lumMod val="85000"/>
+                    <a:lumOff val="15000"/>
+                  </a:schemeClr>
+                </a:solidFill>
+                <a:latin typeface="+mn-lt"/>
+                <a:ea typeface="+mn-ea"/>
+                <a:cs typeface="+mn-cs"/>
+              </a:defRPr>
+            </a:lvl8pPr>
+            <a:lvl9pPr marL="1800000" indent="-228600" algn="l" defTabSz="914400" rtl="0" eaLnBrk="1" latinLnBrk="0" hangingPunct="1">
+              <a:lnSpc>
+                <a:spcPct val="85000"/>
+              </a:lnSpc>
+              <a:spcBef>
+                <a:spcPts val="600"/>
+              </a:spcBef>
+              <a:buFont typeface="Arial" pitchFamily="34" charset="0"/>
+              <a:buChar char=" "/>
+              <a:defRPr sz="1800" kern="1200">
+                <a:solidFill>
+                  <a:schemeClr val="tx1">
+                    <a:lumMod val="85000"/>
+                    <a:lumOff val="15000"/>
+                  </a:schemeClr>
+                </a:solidFill>
+                <a:latin typeface="+mn-lt"/>
+                <a:ea typeface="+mn-ea"/>
+                <a:cs typeface="+mn-cs"/>
+              </a:defRPr>
+            </a:lvl9pPr>
+          </a:lstStyle>
+          <a:p>
+            <a:endParaRPr lang="de-DE" dirty="0"/>
+          </a:p>
+        </p:txBody>
+      </p:sp>
+      <p:sp>
+        <p:nvSpPr>
+          <p:cNvPr id="5" name="Textfeld 4"/>
+          <p:cNvSpPr txBox="1"/>
+          <p:nvPr/>
+        </p:nvSpPr>
+        <p:spPr>
+          <a:xfrm>
+            <a:off x="743330" y="2010481"/>
+            <a:ext cx="1342644" cy="461665"/>
+          </a:xfrm>
+          <a:prstGeom prst="rect">
+            <a:avLst/>
+          </a:prstGeom>
+          <a:noFill/>
+        </p:spPr>
+        <p:txBody>
+          <a:bodyPr wrap="square" rtlCol="0">
+            <a:spAutoFit/>
+          </a:bodyPr>
+          <a:lstStyle/>
+          <a:p>
+            <a:r>
+              <a:rPr lang="de-DE" sz="2400" dirty="0" smtClean="0"/>
+              <a:t>Website</a:t>
+            </a:r>
+            <a:endParaRPr lang="de-DE" sz="2400" dirty="0"/>
+          </a:p>
+        </p:txBody>
+      </p:sp>
+      <p:sp>
+        <p:nvSpPr>
+          <p:cNvPr id="7" name="Textfeld 6"/>
+          <p:cNvSpPr txBox="1"/>
+          <p:nvPr/>
+        </p:nvSpPr>
+        <p:spPr>
+          <a:xfrm>
+            <a:off x="1648588" y="2478495"/>
+            <a:ext cx="2409444" cy="830997"/>
+          </a:xfrm>
+          <a:prstGeom prst="rect">
+            <a:avLst/>
+          </a:prstGeom>
+          <a:noFill/>
+        </p:spPr>
+        <p:txBody>
+          <a:bodyPr wrap="square" rtlCol="0">
+            <a:spAutoFit/>
+          </a:bodyPr>
+          <a:lstStyle/>
+          <a:p>
+            <a:r>
+              <a:rPr lang="de-DE" sz="2400" dirty="0" smtClean="0"/>
+              <a:t>Spieler-Namen</a:t>
+            </a:r>
+          </a:p>
+          <a:p>
+            <a:r>
+              <a:rPr lang="de-DE" sz="2400" dirty="0" smtClean="0"/>
+              <a:t>Kartenanzahl</a:t>
+            </a:r>
+            <a:endParaRPr lang="de-DE" sz="2400" dirty="0"/>
+          </a:p>
+        </p:txBody>
+      </p:sp>
+      <p:sp>
+        <p:nvSpPr>
+          <p:cNvPr id="8" name="Rechteck 7"/>
+          <p:cNvSpPr/>
+          <p:nvPr/>
+        </p:nvSpPr>
+        <p:spPr>
+          <a:xfrm>
+            <a:off x="827377" y="2533305"/>
+            <a:ext cx="509342" cy="3937000"/>
+          </a:xfrm>
+          <a:prstGeom prst="rect">
+            <a:avLst/>
+          </a:prstGeom>
+        </p:spPr>
+        <p:style>
+          <a:lnRef idx="2">
+            <a:schemeClr val="accent1">
+              <a:shade val="50000"/>
+            </a:schemeClr>
+          </a:lnRef>
+          <a:fillRef idx="1">
+            <a:schemeClr val="accent1"/>
+          </a:fillRef>
+          <a:effectRef idx="0">
+            <a:schemeClr val="accent1"/>
+          </a:effectRef>
+          <a:fontRef idx="minor">
+            <a:schemeClr val="lt1"/>
+          </a:fontRef>
+        </p:style>
+        <p:txBody>
+          <a:bodyPr rtlCol="0" anchor="ctr"/>
+          <a:lstStyle/>
+          <a:p>
+            <a:pPr algn="ctr"/>
+            <a:endParaRPr lang="de-DE"/>
+          </a:p>
+        </p:txBody>
+      </p:sp>
+      <p:sp>
+        <p:nvSpPr>
+          <p:cNvPr id="10" name="Textfeld 9"/>
+          <p:cNvSpPr txBox="1"/>
+          <p:nvPr/>
+        </p:nvSpPr>
+        <p:spPr>
+          <a:xfrm>
+            <a:off x="4102697" y="1971032"/>
+            <a:ext cx="1453199" cy="461665"/>
+          </a:xfrm>
+          <a:prstGeom prst="rect">
+            <a:avLst/>
+          </a:prstGeom>
+          <a:noFill/>
+        </p:spPr>
+        <p:txBody>
+          <a:bodyPr wrap="square" rtlCol="0">
+            <a:spAutoFit/>
+          </a:bodyPr>
+          <a:lstStyle/>
+          <a:p>
+            <a:r>
+              <a:rPr lang="de-DE" sz="2400" dirty="0" smtClean="0"/>
+              <a:t>controller</a:t>
+            </a:r>
+            <a:endParaRPr lang="de-DE" sz="2400" dirty="0"/>
+          </a:p>
+        </p:txBody>
+      </p:sp>
+      <p:sp>
+        <p:nvSpPr>
+          <p:cNvPr id="12" name="Textfeld 11"/>
+          <p:cNvSpPr txBox="1"/>
+          <p:nvPr/>
+        </p:nvSpPr>
+        <p:spPr>
+          <a:xfrm>
+            <a:off x="7594019" y="1971277"/>
+            <a:ext cx="2148078" cy="461665"/>
+          </a:xfrm>
+          <a:prstGeom prst="rect">
+            <a:avLst/>
+          </a:prstGeom>
+          <a:noFill/>
+        </p:spPr>
+        <p:txBody>
+          <a:bodyPr wrap="square" rtlCol="0">
+            <a:spAutoFit/>
+          </a:bodyPr>
+          <a:lstStyle/>
+          <a:p>
+            <a:r>
+              <a:rPr lang="de-DE" sz="2400" dirty="0" smtClean="0"/>
+              <a:t>methodsGame</a:t>
+            </a:r>
+            <a:endParaRPr lang="de-DE" sz="2400" dirty="0"/>
+          </a:p>
+        </p:txBody>
+      </p:sp>
+      <p:sp>
+        <p:nvSpPr>
+          <p:cNvPr id="15" name="Textfeld 14"/>
+          <p:cNvSpPr txBox="1"/>
+          <p:nvPr/>
+        </p:nvSpPr>
+        <p:spPr>
+          <a:xfrm>
+            <a:off x="10609546" y="1930073"/>
+            <a:ext cx="1578549" cy="461665"/>
+          </a:xfrm>
+          <a:prstGeom prst="rect">
+            <a:avLst/>
+          </a:prstGeom>
+          <a:noFill/>
+        </p:spPr>
+        <p:txBody>
+          <a:bodyPr wrap="square" rtlCol="0">
+            <a:spAutoFit/>
+          </a:bodyPr>
+          <a:lstStyle/>
+          <a:p>
+            <a:r>
+              <a:rPr lang="de-DE" sz="2400" dirty="0" smtClean="0"/>
+              <a:t>BaseX</a:t>
+            </a:r>
+            <a:endParaRPr lang="de-DE" sz="2400" dirty="0"/>
+          </a:p>
+        </p:txBody>
+      </p:sp>
+      <p:sp>
+        <p:nvSpPr>
+          <p:cNvPr id="26" name="Textfeld 25"/>
+          <p:cNvSpPr txBox="1"/>
+          <p:nvPr/>
+        </p:nvSpPr>
+        <p:spPr>
+          <a:xfrm>
+            <a:off x="4942539" y="2811923"/>
+            <a:ext cx="2409444" cy="461665"/>
+          </a:xfrm>
+          <a:prstGeom prst="rect">
+            <a:avLst/>
+          </a:prstGeom>
+          <a:noFill/>
+        </p:spPr>
+        <p:txBody>
+          <a:bodyPr wrap="square" rtlCol="0">
+            <a:spAutoFit/>
+          </a:bodyPr>
+          <a:lstStyle/>
+          <a:p>
+            <a:r>
+              <a:rPr lang="de-DE" sz="2400" dirty="0" smtClean="0"/>
+              <a:t>newGameXML()</a:t>
+            </a:r>
+            <a:endParaRPr lang="de-DE" sz="2400" dirty="0"/>
+          </a:p>
+        </p:txBody>
+      </p:sp>
+      <p:sp>
+        <p:nvSpPr>
+          <p:cNvPr id="27" name="Textfeld 26"/>
+          <p:cNvSpPr txBox="1"/>
+          <p:nvPr/>
+        </p:nvSpPr>
+        <p:spPr>
+          <a:xfrm>
+            <a:off x="4963475" y="3332990"/>
+            <a:ext cx="2409444" cy="461665"/>
+          </a:xfrm>
+          <a:prstGeom prst="rect">
+            <a:avLst/>
+          </a:prstGeom>
+          <a:noFill/>
+        </p:spPr>
+        <p:txBody>
+          <a:bodyPr wrap="square" rtlCol="0">
+            <a:spAutoFit/>
+          </a:bodyPr>
+          <a:lstStyle/>
+          <a:p>
+            <a:r>
+              <a:rPr lang="de-DE" sz="2400" dirty="0" smtClean="0"/>
+              <a:t>game</a:t>
+            </a:r>
+            <a:endParaRPr lang="de-DE" sz="2400" dirty="0"/>
+          </a:p>
+        </p:txBody>
+      </p:sp>
+      <p:cxnSp>
+        <p:nvCxnSpPr>
+          <p:cNvPr id="30" name="Gerade Verbindung mit Pfeil 29"/>
+          <p:cNvCxnSpPr/>
+          <p:nvPr/>
+        </p:nvCxnSpPr>
+        <p:spPr>
+          <a:xfrm>
+            <a:off x="8463946" y="4843815"/>
+            <a:ext cx="2083975" cy="0"/>
+          </a:xfrm>
+          <a:prstGeom prst="straightConnector1">
+            <a:avLst/>
+          </a:prstGeom>
+          <a:ln>
+            <a:tailEnd type="triangle"/>
+          </a:ln>
+        </p:spPr>
+        <p:style>
+          <a:lnRef idx="1">
+            <a:schemeClr val="accent1"/>
+          </a:lnRef>
+          <a:fillRef idx="0">
+            <a:schemeClr val="accent1"/>
+          </a:fillRef>
+          <a:effectRef idx="0">
+            <a:schemeClr val="accent1"/>
+          </a:effectRef>
+          <a:fontRef idx="minor">
+            <a:schemeClr val="tx1"/>
+          </a:fontRef>
+        </p:style>
+      </p:cxnSp>
+      <p:sp>
+        <p:nvSpPr>
+          <p:cNvPr id="32" name="Textfeld 31"/>
+          <p:cNvSpPr txBox="1"/>
+          <p:nvPr/>
+        </p:nvSpPr>
+        <p:spPr>
+          <a:xfrm>
+            <a:off x="4942539" y="4346114"/>
+            <a:ext cx="2409444" cy="461665"/>
+          </a:xfrm>
+          <a:prstGeom prst="rect">
+            <a:avLst/>
+          </a:prstGeom>
+          <a:noFill/>
+        </p:spPr>
+        <p:txBody>
+          <a:bodyPr wrap="square" rtlCol="0">
+            <a:spAutoFit/>
+          </a:bodyPr>
+          <a:lstStyle/>
+          <a:p>
+            <a:r>
+              <a:rPr lang="de-DE" sz="2400" dirty="0" smtClean="0"/>
+              <a:t>insertGame</a:t>
+            </a:r>
+            <a:endParaRPr lang="de-DE" sz="2400" dirty="0"/>
+          </a:p>
+        </p:txBody>
+      </p:sp>
+      <p:sp>
+        <p:nvSpPr>
+          <p:cNvPr id="33" name="Textfeld 32"/>
+          <p:cNvSpPr txBox="1"/>
+          <p:nvPr/>
+        </p:nvSpPr>
+        <p:spPr>
+          <a:xfrm>
+            <a:off x="8437583" y="4303775"/>
+            <a:ext cx="2409444" cy="461665"/>
+          </a:xfrm>
+          <a:prstGeom prst="rect">
+            <a:avLst/>
+          </a:prstGeom>
+          <a:noFill/>
+        </p:spPr>
+        <p:txBody>
+          <a:bodyPr wrap="square" rtlCol="0">
+            <a:spAutoFit/>
+          </a:bodyPr>
+          <a:lstStyle/>
+          <a:p>
+            <a:r>
+              <a:rPr lang="de-DE" sz="2400" dirty="0" smtClean="0"/>
+              <a:t>game</a:t>
+            </a:r>
+            <a:endParaRPr lang="de-DE" sz="2400" dirty="0"/>
+          </a:p>
+        </p:txBody>
+      </p:sp>
+      <p:sp>
+        <p:nvSpPr>
+          <p:cNvPr id="34" name="Textfeld 33"/>
+          <p:cNvSpPr txBox="1"/>
+          <p:nvPr/>
+        </p:nvSpPr>
+        <p:spPr>
+          <a:xfrm>
+            <a:off x="4950311" y="5279311"/>
+            <a:ext cx="2409444" cy="461665"/>
+          </a:xfrm>
+          <a:prstGeom prst="rect">
+            <a:avLst/>
+          </a:prstGeom>
+          <a:noFill/>
+        </p:spPr>
+        <p:txBody>
+          <a:bodyPr wrap="square" rtlCol="0">
+            <a:spAutoFit/>
+          </a:bodyPr>
+          <a:lstStyle/>
+          <a:p>
+            <a:r>
+              <a:rPr lang="de-DE" sz="2400" dirty="0" smtClean="0"/>
+              <a:t>startByData</a:t>
+            </a:r>
+            <a:endParaRPr lang="de-DE" sz="2400" dirty="0"/>
+          </a:p>
+        </p:txBody>
+      </p:sp>
+      <p:sp>
+        <p:nvSpPr>
+          <p:cNvPr id="35" name="Textfeld 34"/>
+          <p:cNvSpPr txBox="1"/>
+          <p:nvPr/>
+        </p:nvSpPr>
+        <p:spPr>
+          <a:xfrm>
+            <a:off x="4942539" y="5731667"/>
+            <a:ext cx="2409444" cy="461665"/>
+          </a:xfrm>
+          <a:prstGeom prst="rect">
+            <a:avLst/>
+          </a:prstGeom>
+          <a:noFill/>
+        </p:spPr>
+        <p:txBody>
+          <a:bodyPr wrap="square" rtlCol="0">
+            <a:spAutoFit/>
+          </a:bodyPr>
+          <a:lstStyle/>
+          <a:p>
+            <a:r>
+              <a:rPr lang="de-DE" sz="2400" dirty="0" smtClean="0"/>
+              <a:t>html</a:t>
+            </a:r>
+            <a:endParaRPr lang="de-DE" sz="2400" dirty="0"/>
+          </a:p>
+        </p:txBody>
+      </p:sp>
+      <p:sp>
+        <p:nvSpPr>
+          <p:cNvPr id="36" name="Textfeld 35"/>
+          <p:cNvSpPr txBox="1"/>
+          <p:nvPr/>
+        </p:nvSpPr>
+        <p:spPr>
+          <a:xfrm>
+            <a:off x="1668673" y="5699432"/>
+            <a:ext cx="2409444" cy="461665"/>
+          </a:xfrm>
+          <a:prstGeom prst="rect">
+            <a:avLst/>
+          </a:prstGeom>
+          <a:noFill/>
+        </p:spPr>
+        <p:txBody>
+          <a:bodyPr wrap="square" rtlCol="0">
+            <a:spAutoFit/>
+          </a:bodyPr>
+          <a:lstStyle/>
+          <a:p>
+            <a:r>
+              <a:rPr lang="de-DE" sz="2400" dirty="0" smtClean="0"/>
+              <a:t>html</a:t>
+            </a:r>
+            <a:endParaRPr lang="de-DE" sz="2400" dirty="0"/>
+          </a:p>
+        </p:txBody>
+      </p:sp>
+      <p:cxnSp>
+        <p:nvCxnSpPr>
+          <p:cNvPr id="43" name="Gerade Verbindung mit Pfeil 42"/>
+          <p:cNvCxnSpPr/>
+          <p:nvPr/>
+        </p:nvCxnSpPr>
+        <p:spPr>
+          <a:xfrm>
+            <a:off x="4892947" y="3309492"/>
+            <a:ext cx="2625941" cy="0"/>
+          </a:xfrm>
+          <a:prstGeom prst="straightConnector1">
+            <a:avLst/>
+          </a:prstGeom>
+          <a:ln>
+            <a:tailEnd type="triangle"/>
+          </a:ln>
+        </p:spPr>
+        <p:style>
+          <a:lnRef idx="1">
+            <a:schemeClr val="accent1"/>
+          </a:lnRef>
+          <a:fillRef idx="0">
+            <a:schemeClr val="accent1"/>
+          </a:fillRef>
+          <a:effectRef idx="0">
+            <a:schemeClr val="accent1"/>
+          </a:effectRef>
+          <a:fontRef idx="minor">
+            <a:schemeClr val="tx1"/>
+          </a:fontRef>
+        </p:style>
+      </p:cxnSp>
+      <p:cxnSp>
+        <p:nvCxnSpPr>
+          <p:cNvPr id="45" name="Gerade Verbindung mit Pfeil 44"/>
+          <p:cNvCxnSpPr/>
+          <p:nvPr/>
+        </p:nvCxnSpPr>
+        <p:spPr>
+          <a:xfrm>
+            <a:off x="1476756" y="3309492"/>
+            <a:ext cx="2625941" cy="0"/>
+          </a:xfrm>
+          <a:prstGeom prst="straightConnector1">
+            <a:avLst/>
+          </a:prstGeom>
+          <a:ln>
+            <a:tailEnd type="triangle"/>
+          </a:ln>
+        </p:spPr>
+        <p:style>
+          <a:lnRef idx="1">
+            <a:schemeClr val="accent1"/>
+          </a:lnRef>
+          <a:fillRef idx="0">
+            <a:schemeClr val="accent1"/>
+          </a:fillRef>
+          <a:effectRef idx="0">
+            <a:schemeClr val="accent1"/>
+          </a:effectRef>
+          <a:fontRef idx="minor">
+            <a:schemeClr val="tx1"/>
+          </a:fontRef>
+        </p:style>
+      </p:cxnSp>
+      <p:cxnSp>
+        <p:nvCxnSpPr>
+          <p:cNvPr id="47" name="Gerade Verbindung mit Pfeil 46"/>
+          <p:cNvCxnSpPr/>
+          <p:nvPr/>
+        </p:nvCxnSpPr>
+        <p:spPr>
+          <a:xfrm flipH="1">
+            <a:off x="4955703" y="3793126"/>
+            <a:ext cx="2542410" cy="0"/>
+          </a:xfrm>
+          <a:prstGeom prst="straightConnector1">
+            <a:avLst/>
+          </a:prstGeom>
+          <a:ln>
+            <a:tailEnd type="triangle"/>
+          </a:ln>
+        </p:spPr>
+        <p:style>
+          <a:lnRef idx="1">
+            <a:schemeClr val="accent1"/>
+          </a:lnRef>
+          <a:fillRef idx="0">
+            <a:schemeClr val="accent1"/>
+          </a:fillRef>
+          <a:effectRef idx="0">
+            <a:schemeClr val="accent1"/>
+          </a:effectRef>
+          <a:fontRef idx="minor">
+            <a:schemeClr val="tx1"/>
+          </a:fontRef>
+        </p:style>
+      </p:cxnSp>
+      <p:cxnSp>
+        <p:nvCxnSpPr>
+          <p:cNvPr id="48" name="Gerade Verbindung mit Pfeil 47"/>
+          <p:cNvCxnSpPr/>
+          <p:nvPr/>
+        </p:nvCxnSpPr>
+        <p:spPr>
+          <a:xfrm>
+            <a:off x="4968079" y="4817087"/>
+            <a:ext cx="2625941" cy="0"/>
+          </a:xfrm>
+          <a:prstGeom prst="straightConnector1">
+            <a:avLst/>
+          </a:prstGeom>
+          <a:ln>
+            <a:tailEnd type="triangle"/>
+          </a:ln>
+        </p:spPr>
+        <p:style>
+          <a:lnRef idx="1">
+            <a:schemeClr val="accent1"/>
+          </a:lnRef>
+          <a:fillRef idx="0">
+            <a:schemeClr val="accent1"/>
+          </a:fillRef>
+          <a:effectRef idx="0">
+            <a:schemeClr val="accent1"/>
+          </a:effectRef>
+          <a:fontRef idx="minor">
+            <a:schemeClr val="tx1"/>
+          </a:fontRef>
+        </p:style>
+      </p:cxnSp>
+      <p:cxnSp>
+        <p:nvCxnSpPr>
+          <p:cNvPr id="50" name="Gerade Verbindung mit Pfeil 49"/>
+          <p:cNvCxnSpPr/>
+          <p:nvPr/>
+        </p:nvCxnSpPr>
+        <p:spPr>
+          <a:xfrm>
+            <a:off x="4968078" y="5764972"/>
+            <a:ext cx="2625941" cy="0"/>
+          </a:xfrm>
+          <a:prstGeom prst="straightConnector1">
+            <a:avLst/>
+          </a:prstGeom>
+          <a:ln>
+            <a:tailEnd type="triangle"/>
+          </a:ln>
+        </p:spPr>
+        <p:style>
+          <a:lnRef idx="1">
+            <a:schemeClr val="accent1"/>
+          </a:lnRef>
+          <a:fillRef idx="0">
+            <a:schemeClr val="accent1"/>
+          </a:fillRef>
+          <a:effectRef idx="0">
+            <a:schemeClr val="accent1"/>
+          </a:effectRef>
+          <a:fontRef idx="minor">
+            <a:schemeClr val="tx1"/>
+          </a:fontRef>
+        </p:style>
+      </p:cxnSp>
+      <p:cxnSp>
+        <p:nvCxnSpPr>
+          <p:cNvPr id="51" name="Gerade Verbindung mit Pfeil 50"/>
+          <p:cNvCxnSpPr/>
+          <p:nvPr/>
+        </p:nvCxnSpPr>
+        <p:spPr>
+          <a:xfrm flipH="1">
+            <a:off x="4955703" y="6213793"/>
+            <a:ext cx="2542410" cy="0"/>
+          </a:xfrm>
+          <a:prstGeom prst="straightConnector1">
+            <a:avLst/>
+          </a:prstGeom>
+          <a:ln>
+            <a:tailEnd type="triangle"/>
+          </a:ln>
+        </p:spPr>
+        <p:style>
+          <a:lnRef idx="1">
+            <a:schemeClr val="accent1"/>
+          </a:lnRef>
+          <a:fillRef idx="0">
+            <a:schemeClr val="accent1"/>
+          </a:fillRef>
+          <a:effectRef idx="0">
+            <a:schemeClr val="accent1"/>
+          </a:effectRef>
+          <a:fontRef idx="minor">
+            <a:schemeClr val="tx1"/>
+          </a:fontRef>
+        </p:style>
+      </p:cxnSp>
+      <p:cxnSp>
+        <p:nvCxnSpPr>
+          <p:cNvPr id="52" name="Gerade Verbindung mit Pfeil 51"/>
+          <p:cNvCxnSpPr/>
+          <p:nvPr/>
+        </p:nvCxnSpPr>
+        <p:spPr>
+          <a:xfrm flipH="1">
+            <a:off x="1560287" y="6215667"/>
+            <a:ext cx="2542410" cy="0"/>
+          </a:xfrm>
+          <a:prstGeom prst="straightConnector1">
+            <a:avLst/>
+          </a:prstGeom>
+          <a:ln>
+            <a:tailEnd type="triangle"/>
+          </a:ln>
+        </p:spPr>
+        <p:style>
+          <a:lnRef idx="1">
+            <a:schemeClr val="accent1"/>
+          </a:lnRef>
+          <a:fillRef idx="0">
+            <a:schemeClr val="accent1"/>
+          </a:fillRef>
+          <a:effectRef idx="0">
+            <a:schemeClr val="accent1"/>
+          </a:effectRef>
+          <a:fontRef idx="minor">
+            <a:schemeClr val="tx1"/>
+          </a:fontRef>
+        </p:style>
+      </p:cxnSp>
+      <p:sp>
+        <p:nvSpPr>
+          <p:cNvPr id="54" name="Rechteck 53"/>
+          <p:cNvSpPr/>
+          <p:nvPr/>
+        </p:nvSpPr>
+        <p:spPr>
+          <a:xfrm>
+            <a:off x="4294738" y="2533305"/>
+            <a:ext cx="509342" cy="3937000"/>
+          </a:xfrm>
+          <a:prstGeom prst="rect">
+            <a:avLst/>
+          </a:prstGeom>
+        </p:spPr>
+        <p:style>
+          <a:lnRef idx="2">
+            <a:schemeClr val="accent1">
+              <a:shade val="50000"/>
+            </a:schemeClr>
+          </a:lnRef>
+          <a:fillRef idx="1">
+            <a:schemeClr val="accent1"/>
+          </a:fillRef>
+          <a:effectRef idx="0">
+            <a:schemeClr val="accent1"/>
+          </a:effectRef>
+          <a:fontRef idx="minor">
+            <a:schemeClr val="lt1"/>
+          </a:fontRef>
+        </p:style>
+        <p:txBody>
+          <a:bodyPr rtlCol="0" anchor="ctr"/>
+          <a:lstStyle/>
+          <a:p>
+            <a:pPr algn="ctr"/>
+            <a:endParaRPr lang="de-DE"/>
+          </a:p>
+        </p:txBody>
+      </p:sp>
+      <p:sp>
+        <p:nvSpPr>
+          <p:cNvPr id="55" name="Rechteck 54"/>
+          <p:cNvSpPr/>
+          <p:nvPr/>
+        </p:nvSpPr>
+        <p:spPr>
+          <a:xfrm>
+            <a:off x="7736200" y="2533305"/>
+            <a:ext cx="509342" cy="3937000"/>
+          </a:xfrm>
+          <a:prstGeom prst="rect">
+            <a:avLst/>
+          </a:prstGeom>
+        </p:spPr>
+        <p:style>
+          <a:lnRef idx="2">
+            <a:schemeClr val="accent1">
+              <a:shade val="50000"/>
+            </a:schemeClr>
+          </a:lnRef>
+          <a:fillRef idx="1">
+            <a:schemeClr val="accent1"/>
+          </a:fillRef>
+          <a:effectRef idx="0">
+            <a:schemeClr val="accent1"/>
+          </a:effectRef>
+          <a:fontRef idx="minor">
+            <a:schemeClr val="lt1"/>
+          </a:fontRef>
+        </p:style>
+        <p:txBody>
+          <a:bodyPr rtlCol="0" anchor="ctr"/>
+          <a:lstStyle/>
+          <a:p>
+            <a:pPr algn="ctr"/>
+            <a:endParaRPr lang="de-DE"/>
+          </a:p>
+        </p:txBody>
+      </p:sp>
+      <p:sp>
+        <p:nvSpPr>
+          <p:cNvPr id="56" name="Rechteck 55"/>
+          <p:cNvSpPr/>
+          <p:nvPr/>
+        </p:nvSpPr>
+        <p:spPr>
+          <a:xfrm>
+            <a:off x="10761608" y="2533305"/>
+            <a:ext cx="509342" cy="3937000"/>
+          </a:xfrm>
+          <a:prstGeom prst="rect">
+            <a:avLst/>
+          </a:prstGeom>
+        </p:spPr>
+        <p:style>
+          <a:lnRef idx="2">
+            <a:schemeClr val="accent1">
+              <a:shade val="50000"/>
+            </a:schemeClr>
+          </a:lnRef>
+          <a:fillRef idx="1">
+            <a:schemeClr val="accent1"/>
+          </a:fillRef>
+          <a:effectRef idx="0">
+            <a:schemeClr val="accent1"/>
+          </a:effectRef>
+          <a:fontRef idx="minor">
+            <a:schemeClr val="lt1"/>
+          </a:fontRef>
+        </p:style>
+        <p:txBody>
+          <a:bodyPr rtlCol="0" anchor="ctr"/>
+          <a:lstStyle/>
+          <a:p>
+            <a:pPr algn="ctr"/>
+            <a:endParaRPr lang="de-DE"/>
+          </a:p>
+        </p:txBody>
+      </p:sp>
+    </p:spTree>
+    <p:extLst>
+      <p:ext uri="{BB962C8B-B14F-4D97-AF65-F5344CB8AC3E}">
+        <p14:creationId xmlns:p14="http://schemas.microsoft.com/office/powerpoint/2010/main" val="198727099"/>
+      </p:ext>
+    </p:extLst>
+  </p:cSld>
+  <p:clrMapOvr>
+    <a:masterClrMapping/>
+  </p:clrMapOvr>
+</p:sld>
+</file>
+
+<file path=ppt/slides/slide6.xml><?xml version="1.0" encoding="utf-8"?>
+<p:sld xmlns:a="http://schemas.openxmlformats.org/drawingml/2006/main" xmlns:r="http://schemas.openxmlformats.org/officeDocument/2006/relationships" xmlns:p="http://schemas.openxmlformats.org/presentationml/2006/main">
+  <p:cSld>
+    <p:spTree>
+      <p:nvGrpSpPr>
+        <p:cNvPr id="1" name=""/>
+        <p:cNvGrpSpPr/>
+        <p:nvPr/>
+      </p:nvGrpSpPr>
+      <p:grpSpPr>
+        <a:xfrm>
+          <a:off x="0" y="0"/>
+          <a:ext cx="0" cy="0"/>
+          <a:chOff x="0" y="0"/>
+          <a:chExt cx="0" cy="0"/>
+        </a:xfrm>
+      </p:grpSpPr>
+      <p:sp>
+        <p:nvSpPr>
+          <p:cNvPr id="2" name="Titel 1"/>
+          <p:cNvSpPr>
+            <a:spLocks noGrp="1"/>
+          </p:cNvSpPr>
+          <p:nvPr>
+            <p:ph type="title"/>
+          </p:nvPr>
+        </p:nvSpPr>
+        <p:spPr/>
+        <p:txBody>
+          <a:bodyPr/>
+          <a:lstStyle/>
+          <a:p>
+            <a:r>
+              <a:rPr lang="de-DE" dirty="0"/>
+              <a:t>Erzeugung Spiel Daten</a:t>
+            </a:r>
+            <a:endParaRPr lang="de-DE" dirty="0"/>
+          </a:p>
+        </p:txBody>
+      </p:sp>
+      <p:sp>
+        <p:nvSpPr>
+          <p:cNvPr id="6" name="Inhaltsplatzhalter 2"/>
+          <p:cNvSpPr txBox="1">
+            <a:spLocks/>
+          </p:cNvSpPr>
+          <p:nvPr/>
+        </p:nvSpPr>
+        <p:spPr>
+          <a:xfrm>
+            <a:off x="829056" y="2164080"/>
+            <a:ext cx="10753725" cy="3766185"/>
+          </a:xfrm>
+          <a:prstGeom prst="rect">
+            <a:avLst/>
+          </a:prstGeom>
+        </p:spPr>
+        <p:txBody>
+          <a:bodyPr vert="horz" lIns="91440" tIns="45720" rIns="91440" bIns="45720" rtlCol="0">
+            <a:normAutofit/>
+          </a:bodyPr>
+          <a:lstStyle>
+            <a:lvl1pPr marL="91440" indent="-91440" algn="l" defTabSz="914400" rtl="0" eaLnBrk="1" latinLnBrk="0" hangingPunct="1">
+              <a:lnSpc>
+                <a:spcPct val="85000"/>
+              </a:lnSpc>
+              <a:spcBef>
+                <a:spcPts val="1300"/>
+              </a:spcBef>
+              <a:buFont typeface="Arial" pitchFamily="34" charset="0"/>
+              <a:buChar char=" "/>
+              <a:defRPr sz="2400" kern="1200">
+                <a:solidFill>
+                  <a:schemeClr val="tx1">
+                    <a:lumMod val="85000"/>
+                    <a:lumOff val="15000"/>
+                  </a:schemeClr>
+                </a:solidFill>
+                <a:latin typeface="+mn-lt"/>
+                <a:ea typeface="+mn-ea"/>
+                <a:cs typeface="+mn-cs"/>
+              </a:defRPr>
+            </a:lvl1pPr>
+            <a:lvl2pPr marL="347472" indent="-342900" algn="l" defTabSz="914400" rtl="0" eaLnBrk="1" latinLnBrk="0" hangingPunct="1">
+              <a:lnSpc>
+                <a:spcPct val="85000"/>
+              </a:lnSpc>
+              <a:spcBef>
+                <a:spcPts val="600"/>
+              </a:spcBef>
+              <a:buFont typeface="Arial" pitchFamily="34" charset="0"/>
+              <a:buChar char=" "/>
+              <a:defRPr sz="2400" kern="1200">
+                <a:solidFill>
+                  <a:schemeClr val="tx1">
+                    <a:lumMod val="85000"/>
+                    <a:lumOff val="15000"/>
+                  </a:schemeClr>
+                </a:solidFill>
+                <a:latin typeface="+mn-lt"/>
+                <a:ea typeface="+mn-ea"/>
+                <a:cs typeface="+mn-cs"/>
+              </a:defRPr>
+            </a:lvl2pPr>
+            <a:lvl3pPr marL="548640" indent="-548640" algn="l" defTabSz="914400" rtl="0" eaLnBrk="1" latinLnBrk="0" hangingPunct="1">
+              <a:lnSpc>
+                <a:spcPct val="85000"/>
+              </a:lnSpc>
+              <a:spcBef>
+                <a:spcPts val="600"/>
+              </a:spcBef>
+              <a:buFont typeface="Arial" pitchFamily="34" charset="0"/>
+              <a:buChar char=" "/>
+              <a:defRPr sz="2000" i="1" kern="1200">
+                <a:solidFill>
+                  <a:schemeClr val="tx1">
+                    <a:lumMod val="85000"/>
+                    <a:lumOff val="15000"/>
+                  </a:schemeClr>
+                </a:solidFill>
+                <a:latin typeface="+mn-lt"/>
+                <a:ea typeface="+mn-ea"/>
+                <a:cs typeface="+mn-cs"/>
+              </a:defRPr>
+            </a:lvl3pPr>
+            <a:lvl4pPr marL="822960" indent="-822960" algn="l" defTabSz="914400" rtl="0" eaLnBrk="1" latinLnBrk="0" hangingPunct="1">
+              <a:lnSpc>
+                <a:spcPct val="85000"/>
+              </a:lnSpc>
+              <a:spcBef>
+                <a:spcPts val="600"/>
+              </a:spcBef>
+              <a:buFont typeface="Arial" pitchFamily="34" charset="0"/>
+              <a:buChar char=" "/>
+              <a:defRPr sz="1800" kern="1200">
+                <a:solidFill>
+                  <a:schemeClr val="tx1">
+                    <a:lumMod val="85000"/>
+                    <a:lumOff val="15000"/>
+                  </a:schemeClr>
+                </a:solidFill>
+                <a:latin typeface="+mn-lt"/>
+                <a:ea typeface="+mn-ea"/>
+                <a:cs typeface="+mn-cs"/>
+              </a:defRPr>
+            </a:lvl4pPr>
+            <a:lvl5pPr marL="1097280" indent="-1097280" algn="l" defTabSz="914400" rtl="0" eaLnBrk="1" latinLnBrk="0" hangingPunct="1">
+              <a:lnSpc>
+                <a:spcPct val="85000"/>
+              </a:lnSpc>
+              <a:spcBef>
+                <a:spcPts val="600"/>
+              </a:spcBef>
+              <a:buFont typeface="Arial" pitchFamily="34" charset="0"/>
+              <a:buChar char=" "/>
+              <a:defRPr sz="1800" kern="1200">
+                <a:solidFill>
+                  <a:schemeClr val="tx1">
+                    <a:lumMod val="85000"/>
+                    <a:lumOff val="15000"/>
+                  </a:schemeClr>
+                </a:solidFill>
+                <a:latin typeface="+mn-lt"/>
+                <a:ea typeface="+mn-ea"/>
+                <a:cs typeface="+mn-cs"/>
+              </a:defRPr>
+            </a:lvl5pPr>
+            <a:lvl6pPr marL="1200000" indent="-228600" algn="l" defTabSz="914400" rtl="0" eaLnBrk="1" latinLnBrk="0" hangingPunct="1">
+              <a:lnSpc>
+                <a:spcPct val="85000"/>
+              </a:lnSpc>
+              <a:spcBef>
+                <a:spcPts val="600"/>
+              </a:spcBef>
+              <a:buFont typeface="Arial" pitchFamily="34" charset="0"/>
+              <a:buChar char=" "/>
+              <a:defRPr sz="1800" kern="1200">
+                <a:solidFill>
+                  <a:schemeClr val="tx1">
+                    <a:lumMod val="85000"/>
+                    <a:lumOff val="15000"/>
+                  </a:schemeClr>
+                </a:solidFill>
+                <a:latin typeface="+mn-lt"/>
+                <a:ea typeface="+mn-ea"/>
+                <a:cs typeface="+mn-cs"/>
+              </a:defRPr>
+            </a:lvl6pPr>
+            <a:lvl7pPr marL="1400000" indent="-228600" algn="l" defTabSz="914400" rtl="0" eaLnBrk="1" latinLnBrk="0" hangingPunct="1">
+              <a:lnSpc>
+                <a:spcPct val="85000"/>
+              </a:lnSpc>
+              <a:spcBef>
+                <a:spcPts val="600"/>
+              </a:spcBef>
+              <a:buFont typeface="Arial" pitchFamily="34" charset="0"/>
+              <a:buChar char=" "/>
+              <a:defRPr sz="1800" kern="1200">
+                <a:solidFill>
+                  <a:schemeClr val="tx1">
+                    <a:lumMod val="85000"/>
+                    <a:lumOff val="15000"/>
+                  </a:schemeClr>
+                </a:solidFill>
+                <a:latin typeface="+mn-lt"/>
+                <a:ea typeface="+mn-ea"/>
+                <a:cs typeface="+mn-cs"/>
+              </a:defRPr>
+            </a:lvl7pPr>
+            <a:lvl8pPr marL="1600000" indent="-228600" algn="l" defTabSz="914400" rtl="0" eaLnBrk="1" latinLnBrk="0" hangingPunct="1">
+              <a:lnSpc>
+                <a:spcPct val="85000"/>
+              </a:lnSpc>
+              <a:spcBef>
+                <a:spcPts val="600"/>
+              </a:spcBef>
+              <a:buFont typeface="Arial" pitchFamily="34" charset="0"/>
+              <a:buChar char=" "/>
+              <a:defRPr sz="1800" kern="1200">
+                <a:solidFill>
+                  <a:schemeClr val="tx1">
+                    <a:lumMod val="85000"/>
+                    <a:lumOff val="15000"/>
+                  </a:schemeClr>
+                </a:solidFill>
+                <a:latin typeface="+mn-lt"/>
+                <a:ea typeface="+mn-ea"/>
+                <a:cs typeface="+mn-cs"/>
+              </a:defRPr>
+            </a:lvl8pPr>
+            <a:lvl9pPr marL="1800000" indent="-228600" algn="l" defTabSz="914400" rtl="0" eaLnBrk="1" latinLnBrk="0" hangingPunct="1">
+              <a:lnSpc>
+                <a:spcPct val="85000"/>
+              </a:lnSpc>
+              <a:spcBef>
+                <a:spcPts val="600"/>
+              </a:spcBef>
+              <a:buFont typeface="Arial" pitchFamily="34" charset="0"/>
+              <a:buChar char=" "/>
+              <a:defRPr sz="1800" kern="1200">
+                <a:solidFill>
+                  <a:schemeClr val="tx1">
+                    <a:lumMod val="85000"/>
+                    <a:lumOff val="15000"/>
+                  </a:schemeClr>
+                </a:solidFill>
+                <a:latin typeface="+mn-lt"/>
+                <a:ea typeface="+mn-ea"/>
+                <a:cs typeface="+mn-cs"/>
+              </a:defRPr>
+            </a:lvl9pPr>
+          </a:lstStyle>
+          <a:p>
+            <a:endParaRPr lang="de-DE" dirty="0"/>
+          </a:p>
+        </p:txBody>
+      </p:sp>
+      <p:sp>
+        <p:nvSpPr>
+          <p:cNvPr id="7" name="Textfeld 6"/>
+          <p:cNvSpPr txBox="1"/>
+          <p:nvPr/>
+        </p:nvSpPr>
+        <p:spPr>
+          <a:xfrm>
+            <a:off x="802175" y="1776474"/>
+            <a:ext cx="2409444" cy="1200329"/>
+          </a:xfrm>
+          <a:prstGeom prst="rect">
+            <a:avLst/>
+          </a:prstGeom>
+          <a:solidFill>
+            <a:schemeClr val="accent1"/>
+          </a:solidFill>
+          <a:ln w="19050">
+            <a:noFill/>
+          </a:ln>
+        </p:spPr>
+        <p:txBody>
+          <a:bodyPr wrap="square" rtlCol="0">
+            <a:spAutoFit/>
+          </a:bodyPr>
+          <a:lstStyle/>
+          <a:p>
+            <a:pPr marL="342900" indent="-342900">
+              <a:buFont typeface="Symbol" panose="05050102010706020507" pitchFamily="18" charset="2"/>
+              <a:buChar char="-"/>
+            </a:pPr>
+            <a:r>
+              <a:rPr lang="de-DE" sz="2400" dirty="0" smtClean="0">
+                <a:solidFill>
+                  <a:schemeClr val="bg1"/>
+                </a:solidFill>
+              </a:rPr>
+              <a:t>Spieler-Namen</a:t>
+            </a:r>
+          </a:p>
+          <a:p>
+            <a:pPr marL="342900" indent="-342900">
+              <a:buFont typeface="Symbol" panose="05050102010706020507" pitchFamily="18" charset="2"/>
+              <a:buChar char="-"/>
+            </a:pPr>
+            <a:r>
+              <a:rPr lang="de-DE" sz="2400" dirty="0" smtClean="0">
+                <a:solidFill>
+                  <a:schemeClr val="bg1"/>
+                </a:solidFill>
+              </a:rPr>
+              <a:t>Kartenanzahl</a:t>
+            </a:r>
+          </a:p>
+          <a:p>
+            <a:pPr marL="342900" indent="-342900">
+              <a:buFont typeface="Symbol" panose="05050102010706020507" pitchFamily="18" charset="2"/>
+              <a:buChar char="-"/>
+            </a:pPr>
+            <a:r>
+              <a:rPr lang="de-DE" sz="2400" dirty="0" smtClean="0">
+                <a:solidFill>
+                  <a:schemeClr val="bg1"/>
+                </a:solidFill>
+              </a:rPr>
+              <a:t>Spiel-ID</a:t>
+            </a:r>
+            <a:endParaRPr lang="de-DE" sz="2400" dirty="0">
+              <a:solidFill>
+                <a:schemeClr val="bg1"/>
+              </a:solidFill>
+            </a:endParaRPr>
+          </a:p>
+        </p:txBody>
+      </p:sp>
+      <p:cxnSp>
+        <p:nvCxnSpPr>
+          <p:cNvPr id="45" name="Gerade Verbindung mit Pfeil 44"/>
+          <p:cNvCxnSpPr>
+            <a:stCxn id="7" idx="2"/>
+          </p:cNvCxnSpPr>
+          <p:nvPr/>
+        </p:nvCxnSpPr>
+        <p:spPr>
+          <a:xfrm>
+            <a:off x="2006897" y="2976803"/>
+            <a:ext cx="0" cy="457869"/>
+          </a:xfrm>
+          <a:prstGeom prst="straightConnector1">
+            <a:avLst/>
+          </a:prstGeom>
+          <a:ln>
+            <a:tailEnd type="triangle"/>
+          </a:ln>
+        </p:spPr>
+        <p:style>
+          <a:lnRef idx="1">
+            <a:schemeClr val="accent1"/>
+          </a:lnRef>
+          <a:fillRef idx="0">
+            <a:schemeClr val="accent1"/>
+          </a:fillRef>
+          <a:effectRef idx="0">
+            <a:schemeClr val="accent1"/>
+          </a:effectRef>
+          <a:fontRef idx="minor">
+            <a:schemeClr val="tx1"/>
+          </a:fontRef>
+        </p:style>
+      </p:cxnSp>
+      <p:sp>
+        <p:nvSpPr>
+          <p:cNvPr id="29" name="Textfeld 28"/>
+          <p:cNvSpPr txBox="1"/>
+          <p:nvPr/>
+        </p:nvSpPr>
+        <p:spPr>
+          <a:xfrm>
+            <a:off x="802175" y="3521428"/>
+            <a:ext cx="3784303" cy="2308324"/>
+          </a:xfrm>
+          <a:prstGeom prst="rect">
+            <a:avLst/>
+          </a:prstGeom>
+          <a:solidFill>
+            <a:schemeClr val="accent1"/>
+          </a:solidFill>
+          <a:ln w="19050">
+            <a:noFill/>
+          </a:ln>
+        </p:spPr>
+        <p:txBody>
+          <a:bodyPr wrap="square" rtlCol="0">
+            <a:spAutoFit/>
+          </a:bodyPr>
+          <a:lstStyle/>
+          <a:p>
+            <a:r>
+              <a:rPr lang="de-DE" sz="2400" dirty="0" smtClean="0">
+                <a:solidFill>
+                  <a:schemeClr val="bg1"/>
+                </a:solidFill>
+              </a:rPr>
+              <a:t>NewGameXML():</a:t>
+            </a:r>
+          </a:p>
+          <a:p>
+            <a:pPr marL="342900" indent="-342900">
+              <a:buFont typeface="Symbol" panose="05050102010706020507" pitchFamily="18" charset="2"/>
+              <a:buChar char="-"/>
+            </a:pPr>
+            <a:r>
+              <a:rPr lang="de-DE" sz="2400" dirty="0" smtClean="0">
+                <a:solidFill>
+                  <a:schemeClr val="bg1"/>
+                </a:solidFill>
+              </a:rPr>
+              <a:t>Speichern Spiel-ID</a:t>
+            </a:r>
+          </a:p>
+          <a:p>
+            <a:pPr marL="342900" indent="-342900">
+              <a:buFont typeface="Symbol" panose="05050102010706020507" pitchFamily="18" charset="2"/>
+              <a:buChar char="-"/>
+            </a:pPr>
+            <a:r>
+              <a:rPr lang="de-DE" sz="2400" dirty="0" smtClean="0">
+                <a:solidFill>
+                  <a:schemeClr val="bg1"/>
+                </a:solidFill>
+              </a:rPr>
+              <a:t>Setzen von Start-Werten</a:t>
+            </a:r>
+          </a:p>
+          <a:p>
+            <a:pPr marL="342900" indent="-342900">
+              <a:buFont typeface="Symbol" panose="05050102010706020507" pitchFamily="18" charset="2"/>
+              <a:buChar char="-"/>
+            </a:pPr>
+            <a:r>
+              <a:rPr lang="de-DE" sz="2400" dirty="0" smtClean="0">
+                <a:solidFill>
+                  <a:schemeClr val="bg1"/>
+                </a:solidFill>
+              </a:rPr>
+              <a:t>Erstellung Spieler-Element für jeden eingegeben Namen</a:t>
+            </a:r>
+          </a:p>
+        </p:txBody>
+      </p:sp>
+      <p:sp>
+        <p:nvSpPr>
+          <p:cNvPr id="38" name="Textfeld 37"/>
+          <p:cNvSpPr txBox="1"/>
+          <p:nvPr/>
+        </p:nvSpPr>
+        <p:spPr>
+          <a:xfrm>
+            <a:off x="7336218" y="3400337"/>
+            <a:ext cx="4076403" cy="1200329"/>
+          </a:xfrm>
+          <a:prstGeom prst="rect">
+            <a:avLst/>
+          </a:prstGeom>
+          <a:solidFill>
+            <a:schemeClr val="accent1"/>
+          </a:solidFill>
+          <a:ln w="19050">
+            <a:noFill/>
+          </a:ln>
+        </p:spPr>
+        <p:txBody>
+          <a:bodyPr wrap="square" rtlCol="0">
+            <a:spAutoFit/>
+          </a:bodyPr>
+          <a:lstStyle/>
+          <a:p>
+            <a:r>
+              <a:rPr lang="de-DE" sz="2400" dirty="0" smtClean="0">
+                <a:solidFill>
+                  <a:schemeClr val="bg1"/>
+                </a:solidFill>
+              </a:rPr>
+              <a:t>createCards():</a:t>
+            </a:r>
+          </a:p>
+          <a:p>
+            <a:pPr marL="342900" indent="-342900">
+              <a:buFont typeface="Symbol" panose="05050102010706020507" pitchFamily="18" charset="2"/>
+              <a:buChar char="-"/>
+            </a:pPr>
+            <a:r>
+              <a:rPr lang="de-DE" sz="2400" dirty="0" smtClean="0">
+                <a:solidFill>
+                  <a:schemeClr val="bg1"/>
+                </a:solidFill>
+              </a:rPr>
+              <a:t>Erstellung Karten Elemente</a:t>
+            </a:r>
+          </a:p>
+          <a:p>
+            <a:pPr marL="342900" indent="-342900">
+              <a:buFont typeface="Symbol" panose="05050102010706020507" pitchFamily="18" charset="2"/>
+              <a:buChar char="-"/>
+            </a:pPr>
+            <a:r>
+              <a:rPr lang="de-DE" sz="2400" dirty="0" smtClean="0">
+                <a:solidFill>
+                  <a:schemeClr val="bg1"/>
+                </a:solidFill>
+              </a:rPr>
+              <a:t>Position-Wert gleich Null</a:t>
+            </a:r>
+          </a:p>
+        </p:txBody>
+      </p:sp>
+      <p:cxnSp>
+        <p:nvCxnSpPr>
+          <p:cNvPr id="46" name="Gerade Verbindung mit Pfeil 45"/>
+          <p:cNvCxnSpPr/>
+          <p:nvPr/>
+        </p:nvCxnSpPr>
+        <p:spPr>
+          <a:xfrm>
+            <a:off x="4620091" y="3572992"/>
+            <a:ext cx="2716127" cy="0"/>
+          </a:xfrm>
+          <a:prstGeom prst="straightConnector1">
+            <a:avLst/>
+          </a:prstGeom>
+          <a:ln>
+            <a:tailEnd type="triangle"/>
+          </a:ln>
+        </p:spPr>
+        <p:style>
+          <a:lnRef idx="1">
+            <a:schemeClr val="accent1"/>
+          </a:lnRef>
+          <a:fillRef idx="0">
+            <a:schemeClr val="accent1"/>
+          </a:fillRef>
+          <a:effectRef idx="0">
+            <a:schemeClr val="accent1"/>
+          </a:effectRef>
+          <a:fontRef idx="minor">
+            <a:schemeClr val="tx1"/>
+          </a:fontRef>
+        </p:style>
+      </p:cxnSp>
+      <p:sp>
+        <p:nvSpPr>
+          <p:cNvPr id="53" name="Textfeld 52"/>
+          <p:cNvSpPr txBox="1"/>
+          <p:nvPr/>
+        </p:nvSpPr>
+        <p:spPr>
+          <a:xfrm>
+            <a:off x="4559597" y="3082846"/>
+            <a:ext cx="2409444" cy="461665"/>
+          </a:xfrm>
+          <a:prstGeom prst="rect">
+            <a:avLst/>
+          </a:prstGeom>
+          <a:noFill/>
+        </p:spPr>
+        <p:txBody>
+          <a:bodyPr wrap="square" rtlCol="0">
+            <a:spAutoFit/>
+          </a:bodyPr>
+          <a:lstStyle/>
+          <a:p>
+            <a:r>
+              <a:rPr lang="de-DE" sz="2400" dirty="0" smtClean="0"/>
+              <a:t>Kartenzahl</a:t>
+            </a:r>
+            <a:endParaRPr lang="de-DE" sz="2400" dirty="0"/>
+          </a:p>
+        </p:txBody>
+      </p:sp>
+      <p:cxnSp>
+        <p:nvCxnSpPr>
+          <p:cNvPr id="55" name="Gerade Verbindung mit Pfeil 54"/>
+          <p:cNvCxnSpPr/>
+          <p:nvPr/>
+        </p:nvCxnSpPr>
+        <p:spPr>
+          <a:xfrm>
+            <a:off x="4620091" y="5016500"/>
+            <a:ext cx="2716127" cy="0"/>
+          </a:xfrm>
+          <a:prstGeom prst="straightConnector1">
+            <a:avLst/>
+          </a:prstGeom>
+          <a:ln>
+            <a:tailEnd type="triangle"/>
+          </a:ln>
+        </p:spPr>
+        <p:style>
+          <a:lnRef idx="1">
+            <a:schemeClr val="accent1"/>
+          </a:lnRef>
+          <a:fillRef idx="0">
+            <a:schemeClr val="accent1"/>
+          </a:fillRef>
+          <a:effectRef idx="0">
+            <a:schemeClr val="accent1"/>
+          </a:effectRef>
+          <a:fontRef idx="minor">
+            <a:schemeClr val="tx1"/>
+          </a:fontRef>
+        </p:style>
+      </p:cxnSp>
+      <p:cxnSp>
+        <p:nvCxnSpPr>
+          <p:cNvPr id="57" name="Gerade Verbindung mit Pfeil 56"/>
+          <p:cNvCxnSpPr/>
+          <p:nvPr/>
+        </p:nvCxnSpPr>
+        <p:spPr>
+          <a:xfrm flipH="1">
+            <a:off x="4620092" y="4065990"/>
+            <a:ext cx="2716126" cy="0"/>
+          </a:xfrm>
+          <a:prstGeom prst="straightConnector1">
+            <a:avLst/>
+          </a:prstGeom>
+          <a:ln>
+            <a:tailEnd type="triangle"/>
+          </a:ln>
+        </p:spPr>
+        <p:style>
+          <a:lnRef idx="1">
+            <a:schemeClr val="accent1"/>
+          </a:lnRef>
+          <a:fillRef idx="0">
+            <a:schemeClr val="accent1"/>
+          </a:fillRef>
+          <a:effectRef idx="0">
+            <a:schemeClr val="accent1"/>
+          </a:effectRef>
+          <a:fontRef idx="minor">
+            <a:schemeClr val="tx1"/>
+          </a:fontRef>
+        </p:style>
+      </p:cxnSp>
+      <p:sp>
+        <p:nvSpPr>
+          <p:cNvPr id="58" name="Textfeld 57"/>
+          <p:cNvSpPr txBox="1"/>
+          <p:nvPr/>
+        </p:nvSpPr>
+        <p:spPr>
+          <a:xfrm>
+            <a:off x="7336218" y="4675590"/>
+            <a:ext cx="4076403" cy="1938992"/>
+          </a:xfrm>
+          <a:prstGeom prst="rect">
+            <a:avLst/>
+          </a:prstGeom>
+          <a:solidFill>
+            <a:schemeClr val="accent1"/>
+          </a:solidFill>
+          <a:ln w="19050">
+            <a:noFill/>
+          </a:ln>
+        </p:spPr>
+        <p:txBody>
+          <a:bodyPr wrap="square" rtlCol="0">
+            <a:spAutoFit/>
+          </a:bodyPr>
+          <a:lstStyle/>
+          <a:p>
+            <a:r>
+              <a:rPr lang="de-DE" sz="2400" dirty="0" smtClean="0">
+                <a:solidFill>
+                  <a:schemeClr val="bg1"/>
+                </a:solidFill>
+              </a:rPr>
+              <a:t>spreadCards():</a:t>
+            </a:r>
+          </a:p>
+          <a:p>
+            <a:pPr marL="457200" indent="-457200">
+              <a:buFont typeface="Symbol" panose="05050102010706020507" pitchFamily="18" charset="2"/>
+              <a:buChar char="-"/>
+            </a:pPr>
+            <a:r>
+              <a:rPr lang="de-DE" sz="2400" dirty="0" smtClean="0">
+                <a:solidFill>
+                  <a:schemeClr val="bg1"/>
+                </a:solidFill>
+              </a:rPr>
+              <a:t>Permutation der Karten Elemente</a:t>
+            </a:r>
+          </a:p>
+          <a:p>
+            <a:pPr marL="457200" indent="-457200">
+              <a:buFont typeface="Symbol" panose="05050102010706020507" pitchFamily="18" charset="2"/>
+              <a:buChar char="-"/>
+            </a:pPr>
+            <a:r>
+              <a:rPr lang="de-DE" sz="2400" dirty="0" smtClean="0">
+                <a:solidFill>
+                  <a:schemeClr val="bg1"/>
+                </a:solidFill>
+              </a:rPr>
+              <a:t>Zuordnung Zeilen und Spalten-Zahl</a:t>
+            </a:r>
+          </a:p>
+        </p:txBody>
+      </p:sp>
+      <p:sp>
+        <p:nvSpPr>
+          <p:cNvPr id="62" name="Textfeld 61"/>
+          <p:cNvSpPr txBox="1"/>
+          <p:nvPr/>
+        </p:nvSpPr>
+        <p:spPr>
+          <a:xfrm>
+            <a:off x="4559597" y="3593328"/>
+            <a:ext cx="2409444" cy="461665"/>
+          </a:xfrm>
+          <a:prstGeom prst="rect">
+            <a:avLst/>
+          </a:prstGeom>
+          <a:noFill/>
+        </p:spPr>
+        <p:txBody>
+          <a:bodyPr wrap="square" rtlCol="0">
+            <a:spAutoFit/>
+          </a:bodyPr>
+          <a:lstStyle/>
+          <a:p>
+            <a:r>
+              <a:rPr lang="de-DE" sz="2400" dirty="0" smtClean="0"/>
+              <a:t>Karten-Elemente</a:t>
+            </a:r>
+            <a:endParaRPr lang="de-DE" sz="2400" dirty="0"/>
+          </a:p>
+        </p:txBody>
+      </p:sp>
+      <p:sp>
+        <p:nvSpPr>
+          <p:cNvPr id="65" name="Textfeld 64"/>
+          <p:cNvSpPr txBox="1"/>
+          <p:nvPr/>
+        </p:nvSpPr>
+        <p:spPr>
+          <a:xfrm>
+            <a:off x="4613359" y="4586622"/>
+            <a:ext cx="2409444" cy="461665"/>
+          </a:xfrm>
+          <a:prstGeom prst="rect">
+            <a:avLst/>
+          </a:prstGeom>
+          <a:noFill/>
+        </p:spPr>
+        <p:txBody>
+          <a:bodyPr wrap="square" rtlCol="0">
+            <a:spAutoFit/>
+          </a:bodyPr>
+          <a:lstStyle/>
+          <a:p>
+            <a:r>
+              <a:rPr lang="de-DE" sz="2400" dirty="0" smtClean="0"/>
+              <a:t>Karten-Elemente</a:t>
+            </a:r>
+            <a:endParaRPr lang="de-DE" sz="2400" dirty="0"/>
+          </a:p>
+        </p:txBody>
+      </p:sp>
+      <p:cxnSp>
+        <p:nvCxnSpPr>
+          <p:cNvPr id="66" name="Gerade Verbindung mit Pfeil 65"/>
+          <p:cNvCxnSpPr/>
+          <p:nvPr/>
+        </p:nvCxnSpPr>
+        <p:spPr>
+          <a:xfrm flipH="1">
+            <a:off x="4620092" y="5575919"/>
+            <a:ext cx="2716126" cy="0"/>
+          </a:xfrm>
+          <a:prstGeom prst="straightConnector1">
+            <a:avLst/>
+          </a:prstGeom>
+          <a:ln>
+            <a:tailEnd type="triangle"/>
+          </a:ln>
+        </p:spPr>
+        <p:style>
+          <a:lnRef idx="1">
+            <a:schemeClr val="accent1"/>
+          </a:lnRef>
+          <a:fillRef idx="0">
+            <a:schemeClr val="accent1"/>
+          </a:fillRef>
+          <a:effectRef idx="0">
+            <a:schemeClr val="accent1"/>
+          </a:effectRef>
+          <a:fontRef idx="minor">
+            <a:schemeClr val="tx1"/>
+          </a:fontRef>
+        </p:style>
+      </p:cxnSp>
+      <p:sp>
+        <p:nvSpPr>
+          <p:cNvPr id="67" name="Textfeld 66"/>
+          <p:cNvSpPr txBox="1"/>
+          <p:nvPr/>
+        </p:nvSpPr>
+        <p:spPr>
+          <a:xfrm>
+            <a:off x="4559597" y="5103257"/>
+            <a:ext cx="2409444" cy="461665"/>
+          </a:xfrm>
+          <a:prstGeom prst="rect">
+            <a:avLst/>
+          </a:prstGeom>
+          <a:noFill/>
+        </p:spPr>
+        <p:txBody>
+          <a:bodyPr wrap="square" rtlCol="0">
+            <a:spAutoFit/>
+          </a:bodyPr>
+          <a:lstStyle/>
+          <a:p>
+            <a:r>
+              <a:rPr lang="de-DE" sz="2400" dirty="0" smtClean="0"/>
+              <a:t>Karten-Elemente</a:t>
+            </a:r>
+            <a:endParaRPr lang="de-DE" sz="2400" dirty="0"/>
+          </a:p>
+        </p:txBody>
+      </p:sp>
+    </p:spTree>
+    <p:extLst>
+      <p:ext uri="{BB962C8B-B14F-4D97-AF65-F5344CB8AC3E}">
+        <p14:creationId xmlns:p14="http://schemas.microsoft.com/office/powerpoint/2010/main" val="4134925887"/>
+      </p:ext>
+    </p:extLst>
+  </p:cSld>
+  <p:clrMapOvr>
+    <a:masterClrMapping/>
+  </p:clrMapOvr>
+</p:sld>
+</file>
+
+<file path=ppt/slides/slide7.xml><?xml version="1.0" encoding="utf-8"?>
+<p:sld xmlns:a="http://schemas.openxmlformats.org/drawingml/2006/main" xmlns:r="http://schemas.openxmlformats.org/officeDocument/2006/relationships" xmlns:p="http://schemas.openxmlformats.org/presentationml/2006/main">
+  <p:cSld>
+    <p:spTree>
+      <p:nvGrpSpPr>
+        <p:cNvPr id="1" name=""/>
+        <p:cNvGrpSpPr/>
+        <p:nvPr/>
+      </p:nvGrpSpPr>
+      <p:grpSpPr>
+        <a:xfrm>
+          <a:off x="0" y="0"/>
+          <a:ext cx="0" cy="0"/>
+          <a:chOff x="0" y="0"/>
+          <a:chExt cx="0" cy="0"/>
+        </a:xfrm>
+      </p:grpSpPr>
+      <p:sp>
+        <p:nvSpPr>
+          <p:cNvPr id="2" name="Titel 1"/>
+          <p:cNvSpPr>
+            <a:spLocks noGrp="1"/>
+          </p:cNvSpPr>
+          <p:nvPr>
+            <p:ph type="title"/>
+          </p:nvPr>
+        </p:nvSpPr>
+        <p:spPr/>
+        <p:txBody>
+          <a:bodyPr/>
+          <a:lstStyle/>
+          <a:p>
+            <a:r>
+              <a:rPr lang="de-DE" dirty="0"/>
+              <a:t>Spiel – Aufbau und Design</a:t>
+            </a:r>
+          </a:p>
+        </p:txBody>
+      </p:sp>
+      <p:sp>
+        <p:nvSpPr>
+          <p:cNvPr id="3" name="Inhaltsplatzhalter 2"/>
+          <p:cNvSpPr>
+            <a:spLocks noGrp="1"/>
+          </p:cNvSpPr>
+          <p:nvPr>
+            <p:ph idx="1"/>
+          </p:nvPr>
+        </p:nvSpPr>
+        <p:spPr/>
+        <p:txBody>
+          <a:bodyPr>
+            <a:normAutofit/>
+          </a:bodyPr>
+          <a:lstStyle/>
+          <a:p>
+            <a:r>
+              <a:rPr lang="de-DE" dirty="0" smtClean="0"/>
+              <a:t>Aufbau Spiel HTML – Vorstellen XSLT Datei</a:t>
+            </a:r>
+          </a:p>
+          <a:p>
+            <a:r>
+              <a:rPr lang="de-DE" dirty="0" smtClean="0"/>
+              <a:t>Vorstellen Design der Karten</a:t>
+            </a:r>
+          </a:p>
+          <a:p>
+            <a:r>
+              <a:rPr lang="de-DE" dirty="0" smtClean="0"/>
+              <a:t>Spielen </a:t>
+            </a:r>
+            <a:r>
+              <a:rPr lang="de-DE" dirty="0"/>
+              <a:t>mehrere Spiele </a:t>
+            </a:r>
+            <a:r>
+              <a:rPr lang="de-DE" dirty="0" smtClean="0"/>
+              <a:t>gleichzeitig möglich – Zeigen</a:t>
+            </a:r>
+            <a:endParaRPr lang="de-DE" dirty="0"/>
+          </a:p>
+          <a:p>
+            <a:r>
+              <a:rPr lang="de-DE" dirty="0"/>
+              <a:t>Nachsehen Karten in Quellcode </a:t>
+            </a:r>
+            <a:r>
+              <a:rPr lang="de-DE" dirty="0" smtClean="0"/>
+              <a:t>ausschließen – Zeigen</a:t>
+            </a:r>
+            <a:endParaRPr lang="de-DE" dirty="0"/>
+          </a:p>
+          <a:p>
+            <a:endParaRPr lang="de-DE" dirty="0"/>
+          </a:p>
+        </p:txBody>
+      </p:sp>
+    </p:spTree>
+    <p:extLst>
+      <p:ext uri="{BB962C8B-B14F-4D97-AF65-F5344CB8AC3E}">
+        <p14:creationId xmlns:p14="http://schemas.microsoft.com/office/powerpoint/2010/main" val="1642387876"/>
+      </p:ext>
+    </p:extLst>
+  </p:cSld>
+  <p:clrMapOvr>
+    <a:masterClrMapping/>
+  </p:clrMapOvr>
+</p:sld>
+</file>
+
+<file path=ppt/slides/slide8.xml><?xml version="1.0" encoding="utf-8"?>
+<p:sld xmlns:a="http://schemas.openxmlformats.org/drawingml/2006/main" xmlns:r="http://schemas.openxmlformats.org/officeDocument/2006/relationships" xmlns:p="http://schemas.openxmlformats.org/presentationml/2006/main">
+  <p:cSld>
+    <p:spTree>
+      <p:nvGrpSpPr>
+        <p:cNvPr id="1" name=""/>
+        <p:cNvGrpSpPr/>
+        <p:nvPr/>
+      </p:nvGrpSpPr>
+      <p:grpSpPr>
+        <a:xfrm>
+          <a:off x="0" y="0"/>
+          <a:ext cx="0" cy="0"/>
+          <a:chOff x="0" y="0"/>
+          <a:chExt cx="0" cy="0"/>
+        </a:xfrm>
+      </p:grpSpPr>
+      <p:sp>
+        <p:nvSpPr>
+          <p:cNvPr id="2" name="Titel 1"/>
+          <p:cNvSpPr>
+            <a:spLocks noGrp="1"/>
+          </p:cNvSpPr>
+          <p:nvPr>
+            <p:ph type="title"/>
+          </p:nvPr>
+        </p:nvSpPr>
+        <p:spPr/>
+        <p:txBody>
+          <a:bodyPr/>
+          <a:lstStyle/>
+          <a:p>
+            <a:r>
+              <a:rPr lang="de-DE" dirty="0" smtClean="0"/>
+              <a:t>Spiel – Karten Logik</a:t>
+            </a:r>
+            <a:endParaRPr lang="de-DE" dirty="0"/>
+          </a:p>
+        </p:txBody>
+      </p:sp>
+      <p:sp>
+        <p:nvSpPr>
+          <p:cNvPr id="3" name="Inhaltsplatzhalter 2"/>
+          <p:cNvSpPr>
+            <a:spLocks noGrp="1"/>
+          </p:cNvSpPr>
+          <p:nvPr>
+            <p:ph idx="1"/>
+          </p:nvPr>
+        </p:nvSpPr>
+        <p:spPr/>
+        <p:txBody>
+          <a:bodyPr>
+            <a:normAutofit/>
+          </a:bodyPr>
+          <a:lstStyle/>
+          <a:p>
+            <a:r>
+              <a:rPr lang="de-DE" dirty="0" smtClean="0"/>
+              <a:t>Vorstellen der Funktion - Drehen </a:t>
+            </a:r>
+            <a:r>
+              <a:rPr lang="de-DE" dirty="0"/>
+              <a:t>Karten</a:t>
+            </a:r>
+          </a:p>
+          <a:p>
+            <a:r>
+              <a:rPr lang="de-DE" dirty="0" smtClean="0"/>
+              <a:t>Aktualisierung Spieler und Punkte</a:t>
+            </a:r>
+          </a:p>
+          <a:p>
+            <a:r>
+              <a:rPr lang="de-DE" dirty="0"/>
+              <a:t>Anzeige Ergebnis nach Spielende</a:t>
+            </a:r>
+          </a:p>
+          <a:p>
+            <a:pPr marL="0" indent="0">
+              <a:buNone/>
+            </a:pPr>
+            <a:endParaRPr lang="de-DE" dirty="0" smtClean="0"/>
+          </a:p>
+          <a:p>
+            <a:endParaRPr lang="de-DE" dirty="0" smtClean="0"/>
+          </a:p>
+          <a:p>
+            <a:endParaRPr lang="de-DE" dirty="0"/>
+          </a:p>
+          <a:p>
+            <a:endParaRPr lang="de-DE" dirty="0"/>
+          </a:p>
+        </p:txBody>
+      </p:sp>
+    </p:spTree>
+    <p:extLst>
+      <p:ext uri="{BB962C8B-B14F-4D97-AF65-F5344CB8AC3E}">
+        <p14:creationId xmlns:p14="http://schemas.microsoft.com/office/powerpoint/2010/main" val="1641024558"/>
+      </p:ext>
+    </p:extLst>
+  </p:cSld>
+  <p:clrMapOvr>
+    <a:masterClrMapping/>
+  </p:clrMapOvr>
+</p:sld>
+</file>
+
+<file path=ppt/slides/slide9.xml><?xml version="1.0" encoding="utf-8"?>
+<p:sld xmlns:a="http://schemas.openxmlformats.org/drawingml/2006/main" xmlns:r="http://schemas.openxmlformats.org/officeDocument/2006/relationships" xmlns:p="http://schemas.openxmlformats.org/presentationml/2006/main">
+  <p:cSld>
+    <p:spTree>
+      <p:nvGrpSpPr>
+        <p:cNvPr id="1" name=""/>
+        <p:cNvGrpSpPr/>
+        <p:nvPr/>
+      </p:nvGrpSpPr>
+      <p:grpSpPr>
+        <a:xfrm>
+          <a:off x="0" y="0"/>
+          <a:ext cx="0" cy="0"/>
+          <a:chOff x="0" y="0"/>
+          <a:chExt cx="0" cy="0"/>
+        </a:xfrm>
+      </p:grpSpPr>
+      <p:sp>
+        <p:nvSpPr>
+          <p:cNvPr id="2" name="Titel 1"/>
+          <p:cNvSpPr>
+            <a:spLocks noGrp="1"/>
+          </p:cNvSpPr>
+          <p:nvPr>
+            <p:ph type="title"/>
+          </p:nvPr>
+        </p:nvSpPr>
+        <p:spPr/>
+        <p:txBody>
+          <a:bodyPr/>
+          <a:lstStyle/>
+          <a:p>
+            <a:r>
+              <a:rPr lang="de-DE" dirty="0" smtClean="0"/>
               <a:t>Lobby – Laden Spiel</a:t>
             </a:r>
             <a:endParaRPr lang="de-DE" dirty="0"/>
@@ -3850,7 +7331,6 @@
               <a:rPr lang="de-DE" dirty="0" smtClean="0"/>
               <a:t>Anzeige Highscores – Funktionen vorstellen</a:t>
             </a:r>
-            <a:endParaRPr lang="de-DE" dirty="0" smtClean="0"/>
           </a:p>
           <a:p>
             <a:r>
@@ -3877,7 +7357,7 @@
 <file path=ppt/theme/theme1.xml><?xml version="1.0" encoding="utf-8"?>
 <a:theme xmlns:a="http://schemas.openxmlformats.org/drawingml/2006/main" name="Metropolitan">
   <a:themeElements>
-    <a:clrScheme name="Metropolitan">
+    <a:clrScheme name="Blau">
       <a:dk1>
         <a:sysClr val="windowText" lastClr="000000"/>
       </a:dk1>
@@ -3885,34 +7365,34 @@
         <a:sysClr val="window" lastClr="FFFFFF"/>
       </a:lt1>
       <a:dk2>
-        <a:srgbClr val="162F33"/>
+        <a:srgbClr val="17406D"/>
       </a:dk2>
       <a:lt2>
-        <a:srgbClr val="EAF0E0"/>
+        <a:srgbClr val="DBEFF9"/>
       </a:lt2>
       <a:accent1>
-        <a:srgbClr val="50B4C8"/>
+        <a:srgbClr val="0F6FC6"/>
       </a:accent1>
       <a:accent2>
-        <a:srgbClr val="A8B97F"/>
+        <a:srgbClr val="009DD9"/>
       </a:accent2>
       <a:accent3>
-        <a:srgbClr val="9B9256"/>
+        <a:srgbClr val="0BD0D9"/>
       </a:accent3>
       <a:accent4>
-        <a:srgbClr val="657689"/>
+        <a:srgbClr val="10CF9B"/>
       </a:accent4>
       <a:accent5>
-        <a:srgbClr val="7A855D"/>
+        <a:srgbClr val="7CCA62"/>
       </a:accent5>
       <a:accent6>
-        <a:srgbClr val="84AC9D"/>
+        <a:srgbClr val="A5C249"/>
       </a:accent6>
       <a:hlink>
-        <a:srgbClr val="2370CD"/>
+        <a:srgbClr val="F49100"/>
       </a:hlink>
       <a:folHlink>
-        <a:srgbClr val="877589"/>
+        <a:srgbClr val="85DFD0"/>
       </a:folHlink>
     </a:clrScheme>
     <a:fontScheme name="Metropolitan">
@@ -4109,4 +7589,265 @@
     </a:ext>
   </a:extLst>
 </a:theme>
+</file>
+
+<file path=ppt/theme/theme2.xml><?xml version="1.0" encoding="utf-8"?>
+<a:theme xmlns:a="http://schemas.openxmlformats.org/drawingml/2006/main" name="Office Theme">
+  <a:themeElements>
+    <a:clrScheme name="Office">
+      <a:dk1>
+        <a:sysClr val="windowText" lastClr="000000"/>
+      </a:dk1>
+      <a:lt1>
+        <a:sysClr val="window" lastClr="FFFFFF"/>
+      </a:lt1>
+      <a:dk2>
+        <a:srgbClr val="44546A"/>
+      </a:dk2>
+      <a:lt2>
+        <a:srgbClr val="E7E6E6"/>
+      </a:lt2>
+      <a:accent1>
+        <a:srgbClr val="5B9BD5"/>
+      </a:accent1>
+      <a:accent2>
+        <a:srgbClr val="ED7D31"/>
+      </a:accent2>
+      <a:accent3>
+        <a:srgbClr val="A5A5A5"/>
+      </a:accent3>
+      <a:accent4>
+        <a:srgbClr val="FFC000"/>
+      </a:accent4>
+      <a:accent5>
+        <a:srgbClr val="4472C4"/>
+      </a:accent5>
+      <a:accent6>
+        <a:srgbClr val="70AD47"/>
+      </a:accent6>
+      <a:hlink>
+        <a:srgbClr val="0563C1"/>
+      </a:hlink>
+      <a:folHlink>
+        <a:srgbClr val="954F72"/>
+      </a:folHlink>
+    </a:clrScheme>
+    <a:fontScheme name="Office">
+      <a:majorFont>
+        <a:latin typeface="Calibri Light" panose="020F0302020204030204"/>
+        <a:ea typeface=""/>
+        <a:cs typeface=""/>
+        <a:font script="Jpan" typeface="ＭＳ Ｐゴシック"/>
+        <a:font script="Hang" typeface="맑은 고딕"/>
+        <a:font script="Hans" typeface="宋体"/>
+        <a:font script="Hant" typeface="新細明體"/>
+        <a:font script="Arab" typeface="Times New Roman"/>
+        <a:font script="Hebr" typeface="Times New Roman"/>
+        <a:font script="Thai" typeface="Angsana New"/>
+        <a:font script="Ethi" typeface="Nyala"/>
+        <a:font script="Beng" typeface="Vrinda"/>
+        <a:font script="Gujr" typeface="Shruti"/>
+        <a:font script="Khmr" typeface="MoolBoran"/>
+        <a:font script="Knda" typeface="Tunga"/>
+        <a:font script="Guru" typeface="Raavi"/>
+        <a:font script="Cans" typeface="Euphemia"/>
+        <a:font script="Cher" typeface="Plantagenet Cherokee"/>
+        <a:font script="Yiii" typeface="Microsoft Yi Baiti"/>
+        <a:font script="Tibt" typeface="Microsoft Himalaya"/>
+        <a:font script="Thaa" typeface="MV Boli"/>
+        <a:font script="Deva" typeface="Mangal"/>
+        <a:font script="Telu" typeface="Gautami"/>
+        <a:font script="Taml" typeface="Latha"/>
+        <a:font script="Syrc" typeface="Estrangelo Edessa"/>
+        <a:font script="Orya" typeface="Kalinga"/>
+        <a:font script="Mlym" typeface="Kartika"/>
+        <a:font script="Laoo" typeface="DokChampa"/>
+        <a:font script="Sinh" typeface="Iskoola Pota"/>
+        <a:font script="Mong" typeface="Mongolian Baiti"/>
+        <a:font script="Viet" typeface="Times New Roman"/>
+        <a:font script="Uigh" typeface="Microsoft Uighur"/>
+        <a:font script="Geor" typeface="Sylfaen"/>
+      </a:majorFont>
+      <a:minorFont>
+        <a:latin typeface="Calibri" panose="020F0502020204030204"/>
+        <a:ea typeface=""/>
+        <a:cs typeface=""/>
+        <a:font script="Jpan" typeface="ＭＳ Ｐゴシック"/>
+        <a:font script="Hang" typeface="맑은 고딕"/>
+        <a:font script="Hans" typeface="宋体"/>
+        <a:font script="Hant" typeface="新細明體"/>
+        <a:font script="Arab" typeface="Arial"/>
+        <a:font script="Hebr" typeface="Arial"/>
+        <a:font script="Thai" typeface="Cordia New"/>
+        <a:font script="Ethi" typeface="Nyala"/>
+        <a:font script="Beng" typeface="Vrinda"/>
+        <a:font script="Gujr" typeface="Shruti"/>
+        <a:font script="Khmr" typeface="DaunPenh"/>
+        <a:font script="Knda" typeface="Tunga"/>
+        <a:font script="Guru" typeface="Raavi"/>
+        <a:font script="Cans" typeface="Euphemia"/>
+        <a:font script="Cher" typeface="Plantagenet Cherokee"/>
+        <a:font script="Yiii" typeface="Microsoft Yi Baiti"/>
+        <a:font script="Tibt" typeface="Microsoft Himalaya"/>
+        <a:font script="Thaa" typeface="MV Boli"/>
+        <a:font script="Deva" typeface="Mangal"/>
+        <a:font script="Telu" typeface="Gautami"/>
+        <a:font script="Taml" typeface="Latha"/>
+        <a:font script="Syrc" typeface="Estrangelo Edessa"/>
+        <a:font script="Orya" typeface="Kalinga"/>
+        <a:font script="Mlym" typeface="Kartika"/>
+        <a:font script="Laoo" typeface="DokChampa"/>
+        <a:font script="Sinh" typeface="Iskoola Pota"/>
+        <a:font script="Mong" typeface="Mongolian Baiti"/>
+        <a:font script="Viet" typeface="Arial"/>
+        <a:font script="Uigh" typeface="Microsoft Uighur"/>
+        <a:font script="Geor" typeface="Sylfaen"/>
+      </a:minorFont>
+    </a:fontScheme>
+    <a:fmtScheme name="Office">
+      <a:fillStyleLst>
+        <a:solidFill>
+          <a:schemeClr val="phClr"/>
+        </a:solidFill>
+        <a:gradFill rotWithShape="1">
+          <a:gsLst>
+            <a:gs pos="0">
+              <a:schemeClr val="phClr">
+                <a:lumMod val="110000"/>
+                <a:satMod val="105000"/>
+                <a:tint val="67000"/>
+              </a:schemeClr>
+            </a:gs>
+            <a:gs pos="50000">
+              <a:schemeClr val="phClr">
+                <a:lumMod val="105000"/>
+                <a:satMod val="103000"/>
+                <a:tint val="73000"/>
+              </a:schemeClr>
+            </a:gs>
+            <a:gs pos="100000">
+              <a:schemeClr val="phClr">
+                <a:lumMod val="105000"/>
+                <a:satMod val="109000"/>
+                <a:tint val="81000"/>
+              </a:schemeClr>
+            </a:gs>
+          </a:gsLst>
+          <a:lin ang="5400000" scaled="0"/>
+        </a:gradFill>
+        <a:gradFill rotWithShape="1">
+          <a:gsLst>
+            <a:gs pos="0">
+              <a:schemeClr val="phClr">
+                <a:satMod val="103000"/>
+                <a:lumMod val="102000"/>
+                <a:tint val="94000"/>
+              </a:schemeClr>
+            </a:gs>
+            <a:gs pos="50000">
+              <a:schemeClr val="phClr">
+                <a:satMod val="110000"/>
+                <a:lumMod val="100000"/>
+                <a:shade val="100000"/>
+              </a:schemeClr>
+            </a:gs>
+            <a:gs pos="100000">
+              <a:schemeClr val="phClr">
+                <a:lumMod val="99000"/>
+                <a:satMod val="120000"/>
+                <a:shade val="78000"/>
+              </a:schemeClr>
+            </a:gs>
+          </a:gsLst>
+          <a:lin ang="5400000" scaled="0"/>
+        </a:gradFill>
+      </a:fillStyleLst>
+      <a:lnStyleLst>
+        <a:ln w="6350" cap="flat" cmpd="sng" algn="ctr">
+          <a:solidFill>
+            <a:schemeClr val="phClr"/>
+          </a:solidFill>
+          <a:prstDash val="solid"/>
+          <a:miter lim="800000"/>
+        </a:ln>
+        <a:ln w="12700" cap="flat" cmpd="sng" algn="ctr">
+          <a:solidFill>
+            <a:schemeClr val="phClr"/>
+          </a:solidFill>
+          <a:prstDash val="solid"/>
+          <a:miter lim="800000"/>
+        </a:ln>
+        <a:ln w="19050" cap="flat" cmpd="sng" algn="ctr">
+          <a:solidFill>
+            <a:schemeClr val="phClr"/>
+          </a:solidFill>
+          <a:prstDash val="solid"/>
+          <a:miter lim="800000"/>
+        </a:ln>
+      </a:lnStyleLst>
+      <a:effectStyleLst>
+        <a:effectStyle>
+          <a:effectLst/>
+        </a:effectStyle>
+        <a:effectStyle>
+          <a:effectLst/>
+        </a:effectStyle>
+        <a:effectStyle>
+          <a:effectLst>
+            <a:outerShdw blurRad="57150" dist="19050" dir="5400000" algn="ctr" rotWithShape="0">
+              <a:srgbClr val="000000">
+                <a:alpha val="63000"/>
+              </a:srgbClr>
+            </a:outerShdw>
+          </a:effectLst>
+        </a:effectStyle>
+      </a:effectStyleLst>
+      <a:bgFillStyleLst>
+        <a:solidFill>
+          <a:schemeClr val="phClr"/>
+        </a:solidFill>
+        <a:solidFill>
+          <a:schemeClr val="phClr">
+            <a:tint val="95000"/>
+            <a:satMod val="170000"/>
+          </a:schemeClr>
+        </a:solidFill>
+        <a:gradFill rotWithShape="1">
+          <a:gsLst>
+            <a:gs pos="0">
+              <a:schemeClr val="phClr">
+                <a:tint val="93000"/>
+                <a:satMod val="150000"/>
+                <a:shade val="98000"/>
+                <a:lumMod val="102000"/>
+              </a:schemeClr>
+            </a:gs>
+            <a:gs pos="50000">
+              <a:schemeClr val="phClr">
+                <a:tint val="98000"/>
+                <a:satMod val="130000"/>
+                <a:shade val="90000"/>
+                <a:lumMod val="103000"/>
+              </a:schemeClr>
+            </a:gs>
+            <a:gs pos="100000">
+              <a:schemeClr val="phClr">
+                <a:shade val="63000"/>
+                <a:satMod val="120000"/>
+              </a:schemeClr>
+            </a:gs>
+          </a:gsLst>
+          <a:lin ang="5400000" scaled="0"/>
+        </a:gradFill>
+      </a:bgFillStyleLst>
+    </a:fmtScheme>
+  </a:themeElements>
+  <a:objectDefaults/>
+  <a:extraClrSchemeLst/>
+  <a:extLst>
+    <a:ext uri="{05A4C25C-085E-4340-85A3-A5531E510DB2}">
+      <thm15:themeFamily xmlns:thm15="http://schemas.microsoft.com/office/thememl/2012/main" name="Office Theme" id="{62F939B6-93AF-4DB8-9C6B-D6C7DFDC589F}" vid="{4A3C46E8-61CC-4603-A589-7422A47A8E4A}"/>
+    </a:ext>
+  </a:extLst>
+</a:theme>
 </file>
</xml_diff>

<commit_message>
added new versions of presentation and doku
</commit_message>
<xml_diff>
--- a/Memory.pptx
+++ b/Memory.pptx
@@ -11,12 +11,12 @@
     <p:sldId id="256" r:id="rId2"/>
     <p:sldId id="260" r:id="rId3"/>
     <p:sldId id="268" r:id="rId4"/>
-    <p:sldId id="269" r:id="rId5"/>
-    <p:sldId id="270" r:id="rId6"/>
-    <p:sldId id="271" r:id="rId7"/>
-    <p:sldId id="261" r:id="rId8"/>
-    <p:sldId id="266" r:id="rId9"/>
-    <p:sldId id="267" r:id="rId10"/>
+    <p:sldId id="272" r:id="rId5"/>
+    <p:sldId id="269" r:id="rId6"/>
+    <p:sldId id="270" r:id="rId7"/>
+    <p:sldId id="271" r:id="rId8"/>
+    <p:sldId id="261" r:id="rId9"/>
+    <p:sldId id="266" r:id="rId10"/>
   </p:sldIdLst>
   <p:sldSz cx="12192000" cy="6858000"/>
   <p:notesSz cx="6858000" cy="9144000"/>
@@ -205,7 +205,7 @@
           <a:p>
             <a:fld id="{F4CA3E79-370D-427E-A8C9-62587A8B4DBE}" type="datetimeFigureOut">
               <a:rPr lang="de-DE" smtClean="0"/>
-              <a:t>01.04.2018</a:t>
+              <a:t>05.04.2018</a:t>
             </a:fld>
             <a:endParaRPr lang="de-DE"/>
           </a:p>
@@ -538,7 +538,7 @@
           <a:p>
             <a:fld id="{FE7161BA-70B5-470A-89FF-2464C74D71AC}" type="slidenum">
               <a:rPr lang="de-DE" smtClean="0"/>
-              <a:t>5</a:t>
+              <a:t>6</a:t>
             </a:fld>
             <a:endParaRPr lang="de-DE"/>
           </a:p>
@@ -622,7 +622,7 @@
           <a:p>
             <a:fld id="{FE7161BA-70B5-470A-89FF-2464C74D71AC}" type="slidenum">
               <a:rPr lang="de-DE" smtClean="0"/>
-              <a:t>6</a:t>
+              <a:t>7</a:t>
             </a:fld>
             <a:endParaRPr lang="de-DE"/>
           </a:p>
@@ -841,7 +841,7 @@
           <a:p>
             <a:fld id="{1697554C-315A-4B1C-AB76-9710B4BA9F70}" type="datetimeFigureOut">
               <a:rPr lang="de-DE" smtClean="0"/>
-              <a:t>01.04.2018</a:t>
+              <a:t>05.04.2018</a:t>
             </a:fld>
             <a:endParaRPr lang="de-DE"/>
           </a:p>
@@ -1031,7 +1031,7 @@
           <a:p>
             <a:fld id="{1697554C-315A-4B1C-AB76-9710B4BA9F70}" type="datetimeFigureOut">
               <a:rPr lang="de-DE" smtClean="0"/>
-              <a:t>01.04.2018</a:t>
+              <a:t>05.04.2018</a:t>
             </a:fld>
             <a:endParaRPr lang="de-DE"/>
           </a:p>
@@ -1211,7 +1211,7 @@
           <a:p>
             <a:fld id="{1697554C-315A-4B1C-AB76-9710B4BA9F70}" type="datetimeFigureOut">
               <a:rPr lang="de-DE" smtClean="0"/>
-              <a:t>01.04.2018</a:t>
+              <a:t>05.04.2018</a:t>
             </a:fld>
             <a:endParaRPr lang="de-DE"/>
           </a:p>
@@ -1381,7 +1381,7 @@
           <a:p>
             <a:fld id="{1697554C-315A-4B1C-AB76-9710B4BA9F70}" type="datetimeFigureOut">
               <a:rPr lang="de-DE" smtClean="0"/>
-              <a:t>01.04.2018</a:t>
+              <a:t>05.04.2018</a:t>
             </a:fld>
             <a:endParaRPr lang="de-DE"/>
           </a:p>
@@ -1637,7 +1637,7 @@
           <a:p>
             <a:fld id="{1697554C-315A-4B1C-AB76-9710B4BA9F70}" type="datetimeFigureOut">
               <a:rPr lang="de-DE" smtClean="0"/>
-              <a:t>01.04.2018</a:t>
+              <a:t>05.04.2018</a:t>
             </a:fld>
             <a:endParaRPr lang="de-DE"/>
           </a:p>
@@ -1925,7 +1925,7 @@
           <a:p>
             <a:fld id="{1697554C-315A-4B1C-AB76-9710B4BA9F70}" type="datetimeFigureOut">
               <a:rPr lang="de-DE" smtClean="0"/>
-              <a:t>01.04.2018</a:t>
+              <a:t>05.04.2018</a:t>
             </a:fld>
             <a:endParaRPr lang="de-DE"/>
           </a:p>
@@ -2363,7 +2363,7 @@
           <a:p>
             <a:fld id="{1697554C-315A-4B1C-AB76-9710B4BA9F70}" type="datetimeFigureOut">
               <a:rPr lang="de-DE" smtClean="0"/>
-              <a:t>01.04.2018</a:t>
+              <a:t>05.04.2018</a:t>
             </a:fld>
             <a:endParaRPr lang="de-DE"/>
           </a:p>
@@ -2481,7 +2481,7 @@
           <a:p>
             <a:fld id="{1697554C-315A-4B1C-AB76-9710B4BA9F70}" type="datetimeFigureOut">
               <a:rPr lang="de-DE" smtClean="0"/>
-              <a:t>01.04.2018</a:t>
+              <a:t>05.04.2018</a:t>
             </a:fld>
             <a:endParaRPr lang="de-DE"/>
           </a:p>
@@ -2576,7 +2576,7 @@
           <a:p>
             <a:fld id="{1697554C-315A-4B1C-AB76-9710B4BA9F70}" type="datetimeFigureOut">
               <a:rPr lang="de-DE" smtClean="0"/>
-              <a:t>01.04.2018</a:t>
+              <a:t>05.04.2018</a:t>
             </a:fld>
             <a:endParaRPr lang="de-DE"/>
           </a:p>
@@ -2932,7 +2932,7 @@
           <a:p>
             <a:fld id="{1697554C-315A-4B1C-AB76-9710B4BA9F70}" type="datetimeFigureOut">
               <a:rPr lang="de-DE" smtClean="0"/>
-              <a:t>01.04.2018</a:t>
+              <a:t>05.04.2018</a:t>
             </a:fld>
             <a:endParaRPr lang="de-DE"/>
           </a:p>
@@ -3248,7 +3248,7 @@
           <a:p>
             <a:fld id="{1697554C-315A-4B1C-AB76-9710B4BA9F70}" type="datetimeFigureOut">
               <a:rPr lang="de-DE" smtClean="0"/>
-              <a:t>01.04.2018</a:t>
+              <a:t>05.04.2018</a:t>
             </a:fld>
             <a:endParaRPr lang="de-DE"/>
           </a:p>
@@ -3481,7 +3481,7 @@
           <a:p>
             <a:fld id="{1697554C-315A-4B1C-AB76-9710B4BA9F70}" type="datetimeFigureOut">
               <a:rPr lang="de-DE" smtClean="0"/>
-              <a:t>01.04.2018</a:t>
+              <a:t>05.04.2018</a:t>
             </a:fld>
             <a:endParaRPr lang="de-DE"/>
           </a:p>
@@ -4010,7 +4010,11 @@
           <a:p>
             <a:r>
               <a:rPr lang="de-DE" dirty="0" smtClean="0"/>
-              <a:t>Lobby – neues Spiel</a:t>
+              <a:t>Franzi - Anmeldung </a:t>
+            </a:r>
+            <a:r>
+              <a:rPr lang="de-DE" dirty="0" smtClean="0"/>
+              <a:t>/ Lobby</a:t>
             </a:r>
             <a:endParaRPr lang="de-DE" dirty="0"/>
           </a:p>
@@ -4030,6 +4034,12 @@
         <p:txBody>
           <a:bodyPr/>
           <a:lstStyle/>
+          <a:p>
+            <a:r>
+              <a:rPr lang="de-DE" dirty="0" smtClean="0"/>
+              <a:t>Vorstellung Erzeugung Member</a:t>
+            </a:r>
+          </a:p>
           <a:p>
             <a:r>
               <a:rPr lang="de-DE" dirty="0" smtClean="0"/>
@@ -4038,28 +4048,18 @@
           </a:p>
           <a:p>
             <a:r>
-              <a:rPr lang="de-DE" dirty="0" smtClean="0"/>
-              <a:t>Start </a:t>
-            </a:r>
-            <a:r>
               <a:rPr lang="de-DE" dirty="0"/>
-              <a:t>neues Spiel – Aufbau Datenbank </a:t>
-            </a:r>
-            <a:r>
-              <a:rPr lang="de-DE" dirty="0" smtClean="0"/>
-              <a:t>Eintrag</a:t>
+              <a:t>Anzeige und Start gespeicherte Spiele – Funktionen vorstellen</a:t>
             </a:r>
           </a:p>
           <a:p>
             <a:r>
               <a:rPr lang="de-DE" dirty="0"/>
-              <a:t>Vorstellen </a:t>
-            </a:r>
-            <a:r>
-              <a:rPr lang="de-DE" dirty="0" smtClean="0"/>
-              <a:t>Funktion zur Erstellung der Spiel Einträge</a:t>
-            </a:r>
-            <a:endParaRPr lang="de-DE" dirty="0"/>
+              <a:t>Anzeige Highscores – Funktionen vorstellen</a:t>
+            </a:r>
+          </a:p>
+          <a:p>
+            <a:endParaRPr lang="de-DE" dirty="0" smtClean="0"/>
           </a:p>
           <a:p>
             <a:endParaRPr lang="de-DE" dirty="0"/>
@@ -4116,11 +4116,7 @@
           <a:p>
             <a:r>
               <a:rPr lang="de-DE" dirty="0" smtClean="0"/>
-              <a:t>Gliederung </a:t>
-            </a:r>
-            <a:r>
-              <a:rPr lang="de-DE" dirty="0" smtClean="0"/>
-              <a:t>Lobby</a:t>
+              <a:t>Gliederung Lobby</a:t>
             </a:r>
             <a:endParaRPr lang="de-DE" dirty="0"/>
           </a:p>
@@ -4367,15 +4363,7 @@
             </a:pPr>
             <a:r>
               <a:rPr lang="de-DE" dirty="0" smtClean="0"/>
-              <a:t>Definition </a:t>
-            </a:r>
-            <a:r>
-              <a:rPr lang="de-DE" dirty="0" smtClean="0"/>
-              <a:t>XForms </a:t>
-            </a:r>
-            <a:r>
-              <a:rPr lang="de-DE" dirty="0" smtClean="0"/>
-              <a:t>Instance und Submissions</a:t>
+              <a:t>Definition XForms Instance und Submissions</a:t>
             </a:r>
           </a:p>
           <a:p>
@@ -4480,6 +4468,98 @@
           <a:p>
             <a:r>
               <a:rPr lang="de-DE" dirty="0" smtClean="0"/>
+              <a:t>Joe - Lobby </a:t>
+            </a:r>
+            <a:r>
+              <a:rPr lang="de-DE" dirty="0" smtClean="0"/>
+              <a:t>- Erstellung Spiel</a:t>
+            </a:r>
+            <a:endParaRPr lang="de-DE" dirty="0"/>
+          </a:p>
+        </p:txBody>
+      </p:sp>
+      <p:sp>
+        <p:nvSpPr>
+          <p:cNvPr id="3" name="Inhaltsplatzhalter 2"/>
+          <p:cNvSpPr>
+            <a:spLocks noGrp="1"/>
+          </p:cNvSpPr>
+          <p:nvPr>
+            <p:ph idx="1"/>
+          </p:nvPr>
+        </p:nvSpPr>
+        <p:spPr/>
+        <p:txBody>
+          <a:bodyPr/>
+          <a:lstStyle/>
+          <a:p>
+            <a:r>
+              <a:rPr lang="de-DE" dirty="0" smtClean="0"/>
+              <a:t>Start neues Spiel – Aufbau Datenbank Eintrag</a:t>
+            </a:r>
+          </a:p>
+          <a:p>
+            <a:r>
+              <a:rPr lang="de-DE" dirty="0" smtClean="0"/>
+              <a:t>Vorstellen Funktion zur Erstellung der Spiel Einträge</a:t>
+            </a:r>
+            <a:endParaRPr lang="de-DE" dirty="0"/>
+          </a:p>
+          <a:p>
+            <a:endParaRPr lang="de-DE" dirty="0" smtClean="0"/>
+          </a:p>
+          <a:p>
+            <a:endParaRPr lang="de-DE" dirty="0"/>
+          </a:p>
+        </p:txBody>
+      </p:sp>
+    </p:spTree>
+    <p:extLst>
+      <p:ext uri="{BB962C8B-B14F-4D97-AF65-F5344CB8AC3E}">
+        <p14:creationId xmlns:p14="http://schemas.microsoft.com/office/powerpoint/2010/main" val="2829107180"/>
+      </p:ext>
+    </p:extLst>
+  </p:cSld>
+  <p:clrMapOvr>
+    <a:masterClrMapping/>
+  </p:clrMapOvr>
+</p:sld>
+</file>
+
+<file path=ppt/slides/slide5.xml><?xml version="1.0" encoding="utf-8"?>
+<p:sld xmlns:a="http://schemas.openxmlformats.org/drawingml/2006/main" xmlns:r="http://schemas.openxmlformats.org/officeDocument/2006/relationships" xmlns:p="http://schemas.openxmlformats.org/presentationml/2006/main">
+  <p:cSld>
+    <p:spTree>
+      <p:nvGrpSpPr>
+        <p:cNvPr id="1" name=""/>
+        <p:cNvGrpSpPr/>
+        <p:nvPr/>
+      </p:nvGrpSpPr>
+      <p:grpSpPr>
+        <a:xfrm>
+          <a:off x="0" y="0"/>
+          <a:ext cx="0" cy="0"/>
+          <a:chOff x="0" y="0"/>
+          <a:chExt cx="0" cy="0"/>
+        </a:xfrm>
+      </p:grpSpPr>
+      <p:sp>
+        <p:nvSpPr>
+          <p:cNvPr id="2" name="Titel 1"/>
+          <p:cNvSpPr>
+            <a:spLocks noGrp="1"/>
+          </p:cNvSpPr>
+          <p:nvPr>
+            <p:ph type="title"/>
+          </p:nvPr>
+        </p:nvSpPr>
+        <p:spPr/>
+        <p:txBody>
+          <a:bodyPr/>
+          <a:lstStyle/>
+          <a:p>
+            <a:r>
+              <a:rPr lang="de-DE" dirty="0" smtClean="0"/>
               <a:t>Aufbau Spiel Daten</a:t>
             </a:r>
             <a:endParaRPr lang="de-DE" dirty="0"/>
@@ -4495,7 +4575,7 @@
           <p:nvPr>
             <p:extLst>
               <p:ext uri="{D42A27DB-BD31-4B8C-83A1-F6EECF244321}">
-                <p14:modId xmlns:p14="http://schemas.microsoft.com/office/powerpoint/2010/main" val="2871021920"/>
+                <p14:modId xmlns:p14="http://schemas.microsoft.com/office/powerpoint/2010/main" val="298682355"/>
               </p:ext>
             </p:extLst>
           </p:nvPr>
@@ -5135,7 +5215,7 @@
 </p:sld>
 </file>
 
-<file path=ppt/slides/slide5.xml><?xml version="1.0" encoding="utf-8"?>
+<file path=ppt/slides/slide6.xml><?xml version="1.0" encoding="utf-8"?>
 <p:sld xmlns:a="http://schemas.openxmlformats.org/drawingml/2006/main" xmlns:r="http://schemas.openxmlformats.org/officeDocument/2006/relationships" xmlns:p="http://schemas.openxmlformats.org/presentationml/2006/main">
   <p:cSld>
     <p:spTree>
@@ -6195,7 +6275,7 @@
 </p:sld>
 </file>
 
-<file path=ppt/slides/slide6.xml><?xml version="1.0" encoding="utf-8"?>
+<file path=ppt/slides/slide7.xml><?xml version="1.0" encoding="utf-8"?>
 <p:sld xmlns:a="http://schemas.openxmlformats.org/drawingml/2006/main" xmlns:r="http://schemas.openxmlformats.org/officeDocument/2006/relationships" xmlns:p="http://schemas.openxmlformats.org/presentationml/2006/main">
   <p:cSld>
     <p:spTree>
@@ -6231,7 +6311,6 @@
               <a:rPr lang="de-DE" dirty="0"/>
               <a:t>Erzeugung Spiel Daten</a:t>
             </a:r>
-            <a:endParaRPr lang="de-DE" dirty="0"/>
           </a:p>
         </p:txBody>
       </p:sp>
@@ -7039,117 +7118,6 @@
 </p:sld>
 </file>
 
-<file path=ppt/slides/slide7.xml><?xml version="1.0" encoding="utf-8"?>
-<p:sld xmlns:a="http://schemas.openxmlformats.org/drawingml/2006/main" xmlns:r="http://schemas.openxmlformats.org/officeDocument/2006/relationships" xmlns:p="http://schemas.openxmlformats.org/presentationml/2006/main">
-  <p:cSld>
-    <p:spTree>
-      <p:nvGrpSpPr>
-        <p:cNvPr id="1" name=""/>
-        <p:cNvGrpSpPr/>
-        <p:nvPr/>
-      </p:nvGrpSpPr>
-      <p:grpSpPr>
-        <a:xfrm>
-          <a:off x="0" y="0"/>
-          <a:ext cx="0" cy="0"/>
-          <a:chOff x="0" y="0"/>
-          <a:chExt cx="0" cy="0"/>
-        </a:xfrm>
-      </p:grpSpPr>
-      <p:sp>
-        <p:nvSpPr>
-          <p:cNvPr id="2" name="Titel 1"/>
-          <p:cNvSpPr>
-            <a:spLocks noGrp="1"/>
-          </p:cNvSpPr>
-          <p:nvPr>
-            <p:ph type="title"/>
-          </p:nvPr>
-        </p:nvSpPr>
-        <p:spPr/>
-        <p:txBody>
-          <a:bodyPr/>
-          <a:lstStyle/>
-          <a:p>
-            <a:r>
-              <a:rPr lang="de-DE" dirty="0"/>
-              <a:t>Spiel – Aufbau und Design</a:t>
-            </a:r>
-          </a:p>
-        </p:txBody>
-      </p:sp>
-      <p:sp>
-        <p:nvSpPr>
-          <p:cNvPr id="3" name="Inhaltsplatzhalter 2"/>
-          <p:cNvSpPr>
-            <a:spLocks noGrp="1"/>
-          </p:cNvSpPr>
-          <p:nvPr>
-            <p:ph idx="1"/>
-          </p:nvPr>
-        </p:nvSpPr>
-        <p:spPr/>
-        <p:txBody>
-          <a:bodyPr>
-            <a:normAutofit/>
-          </a:bodyPr>
-          <a:lstStyle/>
-          <a:p>
-            <a:r>
-              <a:rPr lang="de-DE" dirty="0" smtClean="0"/>
-              <a:t>Aufbau Spiel HTML – Vorstellen XSLT Datei</a:t>
-            </a:r>
-          </a:p>
-          <a:p>
-            <a:r>
-              <a:rPr lang="de-DE" dirty="0" smtClean="0"/>
-              <a:t>Vorstellen Design der Karten</a:t>
-            </a:r>
-          </a:p>
-          <a:p>
-            <a:r>
-              <a:rPr lang="de-DE" dirty="0" smtClean="0"/>
-              <a:t>Spielen </a:t>
-            </a:r>
-            <a:r>
-              <a:rPr lang="de-DE" dirty="0"/>
-              <a:t>mehrere Spiele </a:t>
-            </a:r>
-            <a:r>
-              <a:rPr lang="de-DE" dirty="0" smtClean="0"/>
-              <a:t>gleichzeitig möglich – Zeigen</a:t>
-            </a:r>
-            <a:endParaRPr lang="de-DE" dirty="0"/>
-          </a:p>
-          <a:p>
-            <a:r>
-              <a:rPr lang="de-DE" dirty="0"/>
-              <a:t>Nachsehen Karten in Quellcode </a:t>
-            </a:r>
-            <a:r>
-              <a:rPr lang="de-DE" dirty="0" smtClean="0"/>
-              <a:t>ausschließen – Zeigen</a:t>
-            </a:r>
-            <a:endParaRPr lang="de-DE" dirty="0"/>
-          </a:p>
-          <a:p>
-            <a:endParaRPr lang="de-DE" dirty="0"/>
-          </a:p>
-        </p:txBody>
-      </p:sp>
-    </p:spTree>
-    <p:extLst>
-      <p:ext uri="{BB962C8B-B14F-4D97-AF65-F5344CB8AC3E}">
-        <p14:creationId xmlns:p14="http://schemas.microsoft.com/office/powerpoint/2010/main" val="1642387876"/>
-      </p:ext>
-    </p:extLst>
-  </p:cSld>
-  <p:clrMapOvr>
-    <a:masterClrMapping/>
-  </p:clrMapOvr>
-</p:sld>
-</file>
-
 <file path=ppt/slides/slide8.xml><?xml version="1.0" encoding="utf-8"?>
 <p:sld xmlns:a="http://schemas.openxmlformats.org/drawingml/2006/main" xmlns:r="http://schemas.openxmlformats.org/officeDocument/2006/relationships" xmlns:p="http://schemas.openxmlformats.org/presentationml/2006/main">
   <p:cSld>
@@ -7184,9 +7152,12 @@
           <a:p>
             <a:r>
               <a:rPr lang="de-DE" dirty="0" smtClean="0"/>
-              <a:t>Spiel – Karten Logik</a:t>
-            </a:r>
-            <a:endParaRPr lang="de-DE" dirty="0"/>
+              <a:t>Egor - Spiel </a:t>
+            </a:r>
+            <a:r>
+              <a:rPr lang="de-DE" dirty="0"/>
+              <a:t>– Aufbau und Design</a:t>
+            </a:r>
           </a:p>
         </p:txBody>
       </p:sp>
@@ -7209,35 +7180,49 @@
           <a:p>
             <a:r>
               <a:rPr lang="de-DE" dirty="0" smtClean="0"/>
-              <a:t>Vorstellen der Funktion - Drehen </a:t>
+              <a:t>Aufbau Spiel HTML – Vorstellen XSLT Datei</a:t>
+            </a:r>
+          </a:p>
+          <a:p>
+            <a:r>
+              <a:rPr lang="de-DE" dirty="0" smtClean="0"/>
+              <a:t>Vorstellen Design der Karten</a:t>
+            </a:r>
+          </a:p>
+          <a:p>
+            <a:r>
+              <a:rPr lang="de-DE" dirty="0" err="1" smtClean="0"/>
+              <a:t>JQuery</a:t>
+            </a:r>
+            <a:r>
+              <a:rPr lang="de-DE" dirty="0" smtClean="0"/>
+              <a:t> Hilfsfunktionen für Animation vorstellen</a:t>
+            </a:r>
+          </a:p>
+          <a:p>
+            <a:r>
+              <a:rPr lang="de-DE" dirty="0" smtClean="0"/>
+              <a:t>Spielen </a:t>
             </a:r>
             <a:r>
               <a:rPr lang="de-DE" dirty="0"/>
-              <a:t>Karten</a:t>
-            </a:r>
-          </a:p>
-          <a:p>
+              <a:t>mehrere Spiele </a:t>
+            </a:r>
             <a:r>
               <a:rPr lang="de-DE" dirty="0" smtClean="0"/>
-              <a:t>Aktualisierung Spieler und Punkte</a:t>
-            </a:r>
+              <a:t>gleichzeitig möglich – Zeigen</a:t>
+            </a:r>
+            <a:endParaRPr lang="de-DE" dirty="0"/>
           </a:p>
           <a:p>
             <a:r>
               <a:rPr lang="de-DE" dirty="0"/>
-              <a:t>Anzeige Ergebnis nach Spielende</a:t>
-            </a:r>
-          </a:p>
-          <a:p>
-            <a:pPr marL="0" indent="0">
-              <a:buNone/>
-            </a:pPr>
-            <a:endParaRPr lang="de-DE" dirty="0" smtClean="0"/>
-          </a:p>
-          <a:p>
-            <a:endParaRPr lang="de-DE" dirty="0" smtClean="0"/>
-          </a:p>
-          <a:p>
+              <a:t>Nachsehen Karten in Quellcode </a:t>
+            </a:r>
+            <a:r>
+              <a:rPr lang="de-DE" dirty="0" smtClean="0"/>
+              <a:t>ausschließen – Zeigen</a:t>
+            </a:r>
             <a:endParaRPr lang="de-DE" dirty="0"/>
           </a:p>
           <a:p>
@@ -7248,7 +7233,7 @@
     </p:spTree>
     <p:extLst>
       <p:ext uri="{BB962C8B-B14F-4D97-AF65-F5344CB8AC3E}">
-        <p14:creationId xmlns:p14="http://schemas.microsoft.com/office/powerpoint/2010/main" val="1641024558"/>
+        <p14:creationId xmlns:p14="http://schemas.microsoft.com/office/powerpoint/2010/main" val="1642387876"/>
       </p:ext>
     </p:extLst>
   </p:cSld>
@@ -7291,8 +7276,12 @@
           <a:lstStyle/>
           <a:p>
             <a:r>
+              <a:rPr lang="de-DE" smtClean="0"/>
+              <a:t>Tilman - Spiel </a:t>
+            </a:r>
+            <a:r>
               <a:rPr lang="de-DE" dirty="0" smtClean="0"/>
-              <a:t>Lobby – Laden Spiel</a:t>
+              <a:t>– Karten Logik</a:t>
             </a:r>
             <a:endParaRPr lang="de-DE" dirty="0"/>
           </a:p>
@@ -7310,33 +7299,45 @@
         </p:nvSpPr>
         <p:spPr/>
         <p:txBody>
-          <a:bodyPr/>
+          <a:bodyPr>
+            <a:normAutofit/>
+          </a:bodyPr>
           <a:lstStyle/>
           <a:p>
             <a:r>
               <a:rPr lang="de-DE" dirty="0" smtClean="0"/>
-              <a:t>Anzeige </a:t>
+              <a:t>Vorstellen der Funktion - Drehen </a:t>
             </a:r>
             <a:r>
               <a:rPr lang="de-DE" dirty="0"/>
-              <a:t>und Start gespeicherte </a:t>
-            </a:r>
+              <a:t>Karten</a:t>
+            </a:r>
+          </a:p>
+          <a:p>
             <a:r>
               <a:rPr lang="de-DE" dirty="0" smtClean="0"/>
-              <a:t>Spiele – Funktionen vorstellen</a:t>
-            </a:r>
-          </a:p>
-          <a:p>
-            <a:r>
-              <a:rPr lang="de-DE" dirty="0" smtClean="0"/>
-              <a:t>Anzeige Highscores – Funktionen vorstellen</a:t>
-            </a:r>
-          </a:p>
-          <a:p>
-            <a:r>
-              <a:rPr lang="de-DE" dirty="0" smtClean="0"/>
-              <a:t>Vorstellen Kommunikation zwischen Spiel und Controller</a:t>
-            </a:r>
+              <a:t>Aktualisierung Spieler und Punkte</a:t>
+            </a:r>
+          </a:p>
+          <a:p>
+            <a:r>
+              <a:rPr lang="de-DE" dirty="0"/>
+              <a:t>Anzeige Ergebnis nach Spielende</a:t>
+            </a:r>
+          </a:p>
+          <a:p>
+            <a:pPr marL="0" indent="0">
+              <a:buNone/>
+            </a:pPr>
+            <a:endParaRPr lang="de-DE" dirty="0" smtClean="0"/>
+          </a:p>
+          <a:p>
+            <a:endParaRPr lang="de-DE" dirty="0" smtClean="0"/>
+          </a:p>
+          <a:p>
+            <a:endParaRPr lang="de-DE" dirty="0"/>
+          </a:p>
+          <a:p>
             <a:endParaRPr lang="de-DE" dirty="0"/>
           </a:p>
         </p:txBody>
@@ -7344,7 +7345,7 @@
     </p:spTree>
     <p:extLst>
       <p:ext uri="{BB962C8B-B14F-4D97-AF65-F5344CB8AC3E}">
-        <p14:creationId xmlns:p14="http://schemas.microsoft.com/office/powerpoint/2010/main" val="315407292"/>
+        <p14:creationId xmlns:p14="http://schemas.microsoft.com/office/powerpoint/2010/main" val="1641024558"/>
       </p:ext>
     </p:extLst>
   </p:cSld>

</xml_diff>